<commit_message>
Update 3.1 -  Linked Lists
</commit_message>
<xml_diff>
--- a/Programming 4/03.1 Linked Lists/03.1 Linked Lists.pptx
+++ b/Programming 4/03.1 Linked Lists/03.1 Linked Lists.pptx
@@ -5,13 +5,16 @@
     <p:sldMasterId id="2147483648" r:id="rId1"/>
   </p:sldMasterIdLst>
   <p:notesMasterIdLst>
-    <p:notesMasterId r:id="rId6"/>
+    <p:notesMasterId r:id="rId9"/>
   </p:notesMasterIdLst>
   <p:sldIdLst>
     <p:sldId id="256" r:id="rId2"/>
     <p:sldId id="257" r:id="rId3"/>
     <p:sldId id="258" r:id="rId4"/>
     <p:sldId id="259" r:id="rId5"/>
+    <p:sldId id="260" r:id="rId6"/>
+    <p:sldId id="261" r:id="rId7"/>
+    <p:sldId id="262" r:id="rId8"/>
   </p:sldIdLst>
   <p:sldSz cx="9144000" cy="6858000" type="screen4x3"/>
   <p:notesSz cx="6858000" cy="9144000"/>
@@ -211,7 +214,7 @@
           <a:p>
             <a:fld id="{5C6122FC-D7E3-43B5-94FB-2148EE5CCFED}" type="datetimeFigureOut">
               <a:rPr lang="en-NZ" smtClean="0"/>
-              <a:t>1/08/2019</a:t>
+              <a:t>4/08/19</a:t>
             </a:fld>
             <a:endParaRPr lang="en-NZ"/>
           </a:p>
@@ -623,6 +626,38 @@
               <a:buFont typeface="Arial" charset="0"/>
               <a:buChar char="•"/>
             </a:pPr>
+            <a:r>
+              <a:rPr lang="en-US" dirty="0" smtClean="0"/>
+              <a:t>The</a:t>
+            </a:r>
+            <a:r>
+              <a:rPr lang="en-US" baseline="0" dirty="0" smtClean="0"/>
+              <a:t> size of the array has to be declared in advanced</a:t>
+            </a:r>
+          </a:p>
+          <a:p>
+            <a:pPr marL="628650" lvl="1" indent="-171450">
+              <a:buFont typeface="Arial" charset="0"/>
+              <a:buChar char="•"/>
+            </a:pPr>
+            <a:r>
+              <a:rPr lang="en-US" baseline="0" dirty="0" smtClean="0"/>
+              <a:t>Causes problems such as the array is too small and can’t hold enough items</a:t>
+            </a:r>
+          </a:p>
+          <a:p>
+            <a:pPr marL="628650" lvl="1" indent="-171450">
+              <a:buFont typeface="Arial" charset="0"/>
+              <a:buChar char="•"/>
+            </a:pPr>
+            <a:r>
+              <a:rPr lang="en-US" baseline="0" dirty="0" smtClean="0"/>
+              <a:t>Or the array is too large and </a:t>
+            </a:r>
+            <a:r>
+              <a:rPr lang="en-US" baseline="0" smtClean="0"/>
+              <a:t>is wasteful</a:t>
+            </a:r>
             <a:endParaRPr lang="en-US" dirty="0" smtClean="0"/>
           </a:p>
         </p:txBody>
@@ -751,6 +786,270 @@
 </p:notes>
 </file>
 
+<file path=ppt/notesSlides/notesSlide4.xml><?xml version="1.0" encoding="utf-8"?>
+<p:notes xmlns:a="http://schemas.openxmlformats.org/drawingml/2006/main" xmlns:r="http://schemas.openxmlformats.org/officeDocument/2006/relationships" xmlns:p="http://schemas.openxmlformats.org/presentationml/2006/main">
+  <p:cSld>
+    <p:spTree>
+      <p:nvGrpSpPr>
+        <p:cNvPr id="1" name=""/>
+        <p:cNvGrpSpPr/>
+        <p:nvPr/>
+      </p:nvGrpSpPr>
+      <p:grpSpPr>
+        <a:xfrm>
+          <a:off x="0" y="0"/>
+          <a:ext cx="0" cy="0"/>
+          <a:chOff x="0" y="0"/>
+          <a:chExt cx="0" cy="0"/>
+        </a:xfrm>
+      </p:grpSpPr>
+      <p:sp>
+        <p:nvSpPr>
+          <p:cNvPr id="2" name="Slide Image Placeholder 1"/>
+          <p:cNvSpPr>
+            <a:spLocks noGrp="1" noRot="1" noChangeAspect="1"/>
+          </p:cNvSpPr>
+          <p:nvPr>
+            <p:ph type="sldImg"/>
+          </p:nvPr>
+        </p:nvSpPr>
+        <p:spPr/>
+      </p:sp>
+      <p:sp>
+        <p:nvSpPr>
+          <p:cNvPr id="3" name="Notes Placeholder 2"/>
+          <p:cNvSpPr>
+            <a:spLocks noGrp="1"/>
+          </p:cNvSpPr>
+          <p:nvPr>
+            <p:ph type="body" idx="1"/>
+          </p:nvPr>
+        </p:nvSpPr>
+        <p:spPr/>
+        <p:txBody>
+          <a:bodyPr/>
+          <a:lstStyle/>
+          <a:p>
+            <a:pPr marL="171450" indent="-171450">
+              <a:buFont typeface="Arial" charset="0"/>
+              <a:buChar char="•"/>
+            </a:pPr>
+            <a:endParaRPr lang="en-US" dirty="0" smtClean="0"/>
+          </a:p>
+        </p:txBody>
+      </p:sp>
+      <p:sp>
+        <p:nvSpPr>
+          <p:cNvPr id="4" name="Slide Number Placeholder 3"/>
+          <p:cNvSpPr>
+            <a:spLocks noGrp="1"/>
+          </p:cNvSpPr>
+          <p:nvPr>
+            <p:ph type="sldNum" sz="quarter" idx="10"/>
+          </p:nvPr>
+        </p:nvSpPr>
+        <p:spPr/>
+        <p:txBody>
+          <a:bodyPr/>
+          <a:lstStyle/>
+          <a:p>
+            <a:fld id="{5FA57C19-9E0E-4142-AAC1-12A23B691F36}" type="slidenum">
+              <a:rPr lang="en-US" smtClean="0"/>
+              <a:t>5</a:t>
+            </a:fld>
+            <a:endParaRPr lang="en-US"/>
+          </a:p>
+        </p:txBody>
+      </p:sp>
+    </p:spTree>
+    <p:extLst>
+      <p:ext uri="{BB962C8B-B14F-4D97-AF65-F5344CB8AC3E}">
+        <p14:creationId xmlns:p14="http://schemas.microsoft.com/office/powerpoint/2010/main" val="1731410038"/>
+      </p:ext>
+    </p:extLst>
+  </p:cSld>
+  <p:clrMapOvr>
+    <a:masterClrMapping/>
+  </p:clrMapOvr>
+</p:notes>
+</file>
+
+<file path=ppt/notesSlides/notesSlide5.xml><?xml version="1.0" encoding="utf-8"?>
+<p:notes xmlns:a="http://schemas.openxmlformats.org/drawingml/2006/main" xmlns:r="http://schemas.openxmlformats.org/officeDocument/2006/relationships" xmlns:p="http://schemas.openxmlformats.org/presentationml/2006/main">
+  <p:cSld>
+    <p:spTree>
+      <p:nvGrpSpPr>
+        <p:cNvPr id="1" name=""/>
+        <p:cNvGrpSpPr/>
+        <p:nvPr/>
+      </p:nvGrpSpPr>
+      <p:grpSpPr>
+        <a:xfrm>
+          <a:off x="0" y="0"/>
+          <a:ext cx="0" cy="0"/>
+          <a:chOff x="0" y="0"/>
+          <a:chExt cx="0" cy="0"/>
+        </a:xfrm>
+      </p:grpSpPr>
+      <p:sp>
+        <p:nvSpPr>
+          <p:cNvPr id="2" name="Slide Image Placeholder 1"/>
+          <p:cNvSpPr>
+            <a:spLocks noGrp="1" noRot="1" noChangeAspect="1"/>
+          </p:cNvSpPr>
+          <p:nvPr>
+            <p:ph type="sldImg"/>
+          </p:nvPr>
+        </p:nvSpPr>
+        <p:spPr/>
+      </p:sp>
+      <p:sp>
+        <p:nvSpPr>
+          <p:cNvPr id="3" name="Notes Placeholder 2"/>
+          <p:cNvSpPr>
+            <a:spLocks noGrp="1"/>
+          </p:cNvSpPr>
+          <p:nvPr>
+            <p:ph type="body" idx="1"/>
+          </p:nvPr>
+        </p:nvSpPr>
+        <p:spPr/>
+        <p:txBody>
+          <a:bodyPr/>
+          <a:lstStyle/>
+          <a:p>
+            <a:pPr marL="171450" indent="-171450">
+              <a:buFont typeface="Arial" charset="0"/>
+              <a:buChar char="•"/>
+            </a:pPr>
+            <a:endParaRPr lang="en-US" dirty="0" smtClean="0"/>
+          </a:p>
+        </p:txBody>
+      </p:sp>
+      <p:sp>
+        <p:nvSpPr>
+          <p:cNvPr id="4" name="Slide Number Placeholder 3"/>
+          <p:cNvSpPr>
+            <a:spLocks noGrp="1"/>
+          </p:cNvSpPr>
+          <p:nvPr>
+            <p:ph type="sldNum" sz="quarter" idx="10"/>
+          </p:nvPr>
+        </p:nvSpPr>
+        <p:spPr/>
+        <p:txBody>
+          <a:bodyPr/>
+          <a:lstStyle/>
+          <a:p>
+            <a:fld id="{5FA57C19-9E0E-4142-AAC1-12A23B691F36}" type="slidenum">
+              <a:rPr lang="en-US" smtClean="0"/>
+              <a:t>6</a:t>
+            </a:fld>
+            <a:endParaRPr lang="en-US"/>
+          </a:p>
+        </p:txBody>
+      </p:sp>
+    </p:spTree>
+    <p:extLst>
+      <p:ext uri="{BB962C8B-B14F-4D97-AF65-F5344CB8AC3E}">
+        <p14:creationId xmlns:p14="http://schemas.microsoft.com/office/powerpoint/2010/main" val="1647969100"/>
+      </p:ext>
+    </p:extLst>
+  </p:cSld>
+  <p:clrMapOvr>
+    <a:masterClrMapping/>
+  </p:clrMapOvr>
+</p:notes>
+</file>
+
+<file path=ppt/notesSlides/notesSlide6.xml><?xml version="1.0" encoding="utf-8"?>
+<p:notes xmlns:a="http://schemas.openxmlformats.org/drawingml/2006/main" xmlns:r="http://schemas.openxmlformats.org/officeDocument/2006/relationships" xmlns:p="http://schemas.openxmlformats.org/presentationml/2006/main">
+  <p:cSld>
+    <p:spTree>
+      <p:nvGrpSpPr>
+        <p:cNvPr id="1" name=""/>
+        <p:cNvGrpSpPr/>
+        <p:nvPr/>
+      </p:nvGrpSpPr>
+      <p:grpSpPr>
+        <a:xfrm>
+          <a:off x="0" y="0"/>
+          <a:ext cx="0" cy="0"/>
+          <a:chOff x="0" y="0"/>
+          <a:chExt cx="0" cy="0"/>
+        </a:xfrm>
+      </p:grpSpPr>
+      <p:sp>
+        <p:nvSpPr>
+          <p:cNvPr id="2" name="Slide Image Placeholder 1"/>
+          <p:cNvSpPr>
+            <a:spLocks noGrp="1" noRot="1" noChangeAspect="1"/>
+          </p:cNvSpPr>
+          <p:nvPr>
+            <p:ph type="sldImg"/>
+          </p:nvPr>
+        </p:nvSpPr>
+        <p:spPr/>
+      </p:sp>
+      <p:sp>
+        <p:nvSpPr>
+          <p:cNvPr id="3" name="Notes Placeholder 2"/>
+          <p:cNvSpPr>
+            <a:spLocks noGrp="1"/>
+          </p:cNvSpPr>
+          <p:nvPr>
+            <p:ph type="body" idx="1"/>
+          </p:nvPr>
+        </p:nvSpPr>
+        <p:spPr/>
+        <p:txBody>
+          <a:bodyPr/>
+          <a:lstStyle/>
+          <a:p>
+            <a:pPr marL="171450" indent="-171450">
+              <a:buFont typeface="Arial" charset="0"/>
+              <a:buChar char="•"/>
+            </a:pPr>
+            <a:endParaRPr lang="en-US" dirty="0" smtClean="0"/>
+          </a:p>
+        </p:txBody>
+      </p:sp>
+      <p:sp>
+        <p:nvSpPr>
+          <p:cNvPr id="4" name="Slide Number Placeholder 3"/>
+          <p:cNvSpPr>
+            <a:spLocks noGrp="1"/>
+          </p:cNvSpPr>
+          <p:nvPr>
+            <p:ph type="sldNum" sz="quarter" idx="10"/>
+          </p:nvPr>
+        </p:nvSpPr>
+        <p:spPr/>
+        <p:txBody>
+          <a:bodyPr/>
+          <a:lstStyle/>
+          <a:p>
+            <a:fld id="{5FA57C19-9E0E-4142-AAC1-12A23B691F36}" type="slidenum">
+              <a:rPr lang="en-US" smtClean="0"/>
+              <a:t>7</a:t>
+            </a:fld>
+            <a:endParaRPr lang="en-US"/>
+          </a:p>
+        </p:txBody>
+      </p:sp>
+    </p:spTree>
+    <p:extLst>
+      <p:ext uri="{BB962C8B-B14F-4D97-AF65-F5344CB8AC3E}">
+        <p14:creationId xmlns:p14="http://schemas.microsoft.com/office/powerpoint/2010/main" val="1319020755"/>
+      </p:ext>
+    </p:extLst>
+  </p:cSld>
+  <p:clrMapOvr>
+    <a:masterClrMapping/>
+  </p:clrMapOvr>
+</p:notes>
+</file>
+
 <file path=ppt/slideLayouts/slideLayout1.xml><?xml version="1.0" encoding="utf-8"?>
 <p:sldLayout xmlns:a="http://schemas.openxmlformats.org/drawingml/2006/main" xmlns:r="http://schemas.openxmlformats.org/officeDocument/2006/relationships" xmlns:p="http://schemas.openxmlformats.org/presentationml/2006/main" type="title" preserve="1">
   <p:cSld name="Title Slide">
@@ -932,7 +1231,7 @@
           <a:p>
             <a:fld id="{F8166F1F-CE9B-4651-A6AA-CD717754106B}" type="datetimeFigureOut">
               <a:rPr lang="en-US" smtClean="0"/>
-              <a:t>8/1/2019</a:t>
+              <a:t>8/4/19</a:t>
             </a:fld>
             <a:endParaRPr lang="en-US"/>
           </a:p>
@@ -1097,7 +1396,7 @@
           <a:p>
             <a:fld id="{A76116CE-C4A3-4A05-B2D7-7C2E9A889C0F}" type="datetimeFigureOut">
               <a:rPr lang="en-US" smtClean="0"/>
-              <a:t>8/1/2019</a:t>
+              <a:t>8/4/19</a:t>
             </a:fld>
             <a:endParaRPr lang="en-US"/>
           </a:p>
@@ -1272,7 +1571,7 @@
           <a:p>
             <a:fld id="{A76116CE-C4A3-4A05-B2D7-7C2E9A889C0F}" type="datetimeFigureOut">
               <a:rPr lang="en-US" smtClean="0"/>
-              <a:t>8/1/2019</a:t>
+              <a:t>8/4/19</a:t>
             </a:fld>
             <a:endParaRPr lang="en-US"/>
           </a:p>
@@ -1439,7 +1738,7 @@
           <a:p>
             <a:fld id="{A76116CE-C4A3-4A05-B2D7-7C2E9A889C0F}" type="datetimeFigureOut">
               <a:rPr lang="en-US" smtClean="0"/>
-              <a:t>8/1/2019</a:t>
+              <a:t>8/4/19</a:t>
             </a:fld>
             <a:endParaRPr lang="en-US"/>
           </a:p>
@@ -1680,7 +1979,7 @@
           <a:p>
             <a:fld id="{A76116CE-C4A3-4A05-B2D7-7C2E9A889C0F}" type="datetimeFigureOut">
               <a:rPr lang="en-US" smtClean="0"/>
-              <a:t>8/1/2019</a:t>
+              <a:t>8/4/19</a:t>
             </a:fld>
             <a:endParaRPr lang="en-US"/>
           </a:p>
@@ -1963,7 +2262,7 @@
           <a:p>
             <a:fld id="{A76116CE-C4A3-4A05-B2D7-7C2E9A889C0F}" type="datetimeFigureOut">
               <a:rPr lang="en-US" smtClean="0"/>
-              <a:t>8/1/2019</a:t>
+              <a:t>8/4/19</a:t>
             </a:fld>
             <a:endParaRPr lang="en-US"/>
           </a:p>
@@ -2380,7 +2679,7 @@
           <a:p>
             <a:fld id="{A76116CE-C4A3-4A05-B2D7-7C2E9A889C0F}" type="datetimeFigureOut">
               <a:rPr lang="en-US" smtClean="0"/>
-              <a:t>8/1/2019</a:t>
+              <a:t>8/4/19</a:t>
             </a:fld>
             <a:endParaRPr lang="en-US"/>
           </a:p>
@@ -2493,7 +2792,7 @@
           <a:p>
             <a:fld id="{A76116CE-C4A3-4A05-B2D7-7C2E9A889C0F}" type="datetimeFigureOut">
               <a:rPr lang="en-US" smtClean="0"/>
-              <a:t>8/1/2019</a:t>
+              <a:t>8/4/19</a:t>
             </a:fld>
             <a:endParaRPr lang="en-US"/>
           </a:p>
@@ -2583,7 +2882,7 @@
           <a:p>
             <a:fld id="{A76116CE-C4A3-4A05-B2D7-7C2E9A889C0F}" type="datetimeFigureOut">
               <a:rPr lang="en-US" smtClean="0"/>
-              <a:t>8/1/2019</a:t>
+              <a:t>8/4/19</a:t>
             </a:fld>
             <a:endParaRPr lang="en-US"/>
           </a:p>
@@ -2855,7 +3154,7 @@
           <a:p>
             <a:fld id="{A76116CE-C4A3-4A05-B2D7-7C2E9A889C0F}" type="datetimeFigureOut">
               <a:rPr lang="en-US" smtClean="0"/>
-              <a:t>8/1/2019</a:t>
+              <a:t>8/4/19</a:t>
             </a:fld>
             <a:endParaRPr lang="en-US"/>
           </a:p>
@@ -3103,7 +3402,7 @@
           <a:p>
             <a:fld id="{A76116CE-C4A3-4A05-B2D7-7C2E9A889C0F}" type="datetimeFigureOut">
               <a:rPr lang="en-US" smtClean="0"/>
-              <a:t>8/1/2019</a:t>
+              <a:t>8/4/19</a:t>
             </a:fld>
             <a:endParaRPr lang="en-US"/>
           </a:p>
@@ -3311,7 +3610,7 @@
           <a:p>
             <a:fld id="{F8166F1F-CE9B-4651-A6AA-CD717754106B}" type="datetimeFigureOut">
               <a:rPr lang="en-US" smtClean="0"/>
-              <a:t>8/1/2019</a:t>
+              <a:t>8/4/19</a:t>
             </a:fld>
             <a:endParaRPr lang="en-US"/>
           </a:p>
@@ -3720,7 +4019,6 @@
               <a:rPr lang="en-US" sz="4000" b="1" dirty="0" smtClean="0"/>
               <a:t>03.1 Linked Lists</a:t>
             </a:r>
-            <a:endParaRPr lang="en-US" sz="4000" b="1" dirty="0" smtClean="0"/>
           </a:p>
           <a:p>
             <a:pPr algn="ctr"/>
@@ -3811,7 +4109,6 @@
               <a:rPr lang="en-US" sz="3500" b="1" dirty="0" smtClean="0"/>
               <a:t>Data storage for games</a:t>
             </a:r>
-            <a:endParaRPr lang="en-US" sz="3500" b="1" dirty="0" smtClean="0"/>
           </a:p>
           <a:p>
             <a:pPr lvl="1"/>
@@ -3836,7 +4133,6 @@
               <a:rPr lang="en-US" sz="2500" dirty="0" smtClean="0"/>
               <a:t>How can we represent objects in our game?</a:t>
             </a:r>
-            <a:endParaRPr lang="en-US" sz="2500" dirty="0" smtClean="0"/>
           </a:p>
         </p:txBody>
       </p:sp>
@@ -3886,7 +4182,7 @@
         <p:spPr>
           <a:xfrm>
             <a:off x="6096" y="6096"/>
-            <a:ext cx="9144000" cy="5070619"/>
+            <a:ext cx="9144000" cy="4301177"/>
           </a:xfrm>
           <a:prstGeom prst="rect">
             <a:avLst/>
@@ -3908,7 +4204,6 @@
               <a:rPr lang="en-US" sz="3500" b="1" dirty="0" smtClean="0"/>
               <a:t>Static storage</a:t>
             </a:r>
-            <a:endParaRPr lang="en-US" sz="3500" b="1" dirty="0" smtClean="0"/>
           </a:p>
           <a:p>
             <a:pPr lvl="1"/>
@@ -3925,31 +4220,45 @@
             </a:r>
           </a:p>
           <a:p>
-            <a:pPr marL="1657350" lvl="2" indent="-742950">
-              <a:buFont typeface="Arial" panose="020B0604020202020204" pitchFamily="34" charset="0"/>
-              <a:buChar char="•"/>
-            </a:pPr>
-            <a:endParaRPr lang="en-US" sz="2500" dirty="0" smtClean="0"/>
-          </a:p>
-          <a:p>
-            <a:pPr marL="1657350" lvl="2" indent="-742950">
-              <a:buFont typeface="Arial" panose="020B0604020202020204" pitchFamily="34" charset="0"/>
-              <a:buChar char="•"/>
-            </a:pPr>
-            <a:r>
-              <a:rPr lang="en-US" sz="2500" dirty="0" smtClean="0"/>
-              <a:t>Advantages:</a:t>
-            </a:r>
-          </a:p>
-          <a:p>
             <a:pPr marL="2114550" lvl="3" indent="-742950">
               <a:buFont typeface="Arial" panose="020B0604020202020204" pitchFamily="34" charset="0"/>
               <a:buChar char="•"/>
             </a:pPr>
             <a:r>
+              <a:rPr lang="en-US" sz="2500" dirty="0" smtClean="0"/>
+              <a:t>Advantages:</a:t>
+            </a:r>
+          </a:p>
+          <a:p>
+            <a:pPr marL="2571750" lvl="4" indent="-742950">
+              <a:buFont typeface="Arial" panose="020B0604020202020204" pitchFamily="34" charset="0"/>
+              <a:buChar char="•"/>
+            </a:pPr>
+            <a:r>
               <a:rPr lang="en-US" sz="2000" dirty="0" smtClean="0"/>
               <a:t>Easy to create and initialise</a:t>
             </a:r>
+          </a:p>
+          <a:p>
+            <a:pPr marL="2571750" lvl="4" indent="-742950">
+              <a:buFont typeface="Arial" panose="020B0604020202020204" pitchFamily="34" charset="0"/>
+              <a:buChar char="•"/>
+            </a:pPr>
+            <a:r>
+              <a:rPr lang="en-US" sz="2000" dirty="0" smtClean="0"/>
+              <a:t>Easy to index into</a:t>
+            </a:r>
+          </a:p>
+          <a:p>
+            <a:pPr marL="2571750" lvl="4" indent="-742950">
+              <a:buFont typeface="Arial" panose="020B0604020202020204" pitchFamily="34" charset="0"/>
+              <a:buChar char="•"/>
+            </a:pPr>
+            <a:r>
+              <a:rPr lang="en-US" sz="2000" dirty="0" smtClean="0"/>
+              <a:t>Built into most development environments</a:t>
+            </a:r>
+            <a:endParaRPr lang="en-US" sz="2500" dirty="0"/>
           </a:p>
           <a:p>
             <a:pPr marL="2114550" lvl="3" indent="-742950">
@@ -3957,57 +4266,29 @@
               <a:buChar char="•"/>
             </a:pPr>
             <a:r>
-              <a:rPr lang="en-US" sz="2000" dirty="0" smtClean="0"/>
-              <a:t>Easy to index into</a:t>
-            </a:r>
-          </a:p>
-          <a:p>
-            <a:pPr marL="2114550" lvl="3" indent="-742950">
+              <a:rPr lang="en-US" sz="2500" dirty="0" smtClean="0"/>
+              <a:t>Disadvantages:</a:t>
+            </a:r>
+          </a:p>
+          <a:p>
+            <a:pPr marL="2571750" lvl="4" indent="-742950">
               <a:buFont typeface="Arial" panose="020B0604020202020204" pitchFamily="34" charset="0"/>
               <a:buChar char="•"/>
             </a:pPr>
             <a:r>
               <a:rPr lang="en-US" sz="2000" dirty="0" smtClean="0"/>
-              <a:t>Built into most development environments</a:t>
-            </a:r>
-          </a:p>
-          <a:p>
-            <a:pPr marL="1657350" lvl="2" indent="-742950">
+              <a:t>Inflexible size</a:t>
+            </a:r>
+          </a:p>
+          <a:p>
+            <a:pPr marL="2571750" lvl="4" indent="-742950">
               <a:buFont typeface="Arial" panose="020B0604020202020204" pitchFamily="34" charset="0"/>
               <a:buChar char="•"/>
             </a:pPr>
-            <a:endParaRPr lang="en-US" sz="2500" dirty="0"/>
-          </a:p>
-          <a:p>
-            <a:pPr marL="1657350" lvl="2" indent="-742950">
-              <a:buFont typeface="Arial" panose="020B0604020202020204" pitchFamily="34" charset="0"/>
-              <a:buChar char="•"/>
-            </a:pPr>
-            <a:r>
-              <a:rPr lang="en-US" sz="2500" dirty="0" smtClean="0"/>
-              <a:t>Disadvantages:</a:t>
-            </a:r>
-          </a:p>
-          <a:p>
-            <a:pPr marL="2114550" lvl="3" indent="-742950">
-              <a:buFont typeface="Arial" panose="020B0604020202020204" pitchFamily="34" charset="0"/>
-              <a:buChar char="•"/>
-            </a:pPr>
-            <a:r>
-              <a:rPr lang="en-US" sz="2000" dirty="0" smtClean="0"/>
-              <a:t>Inflexible size</a:t>
-            </a:r>
-          </a:p>
-          <a:p>
-            <a:pPr marL="2114550" lvl="3" indent="-742950">
-              <a:buFont typeface="Arial" panose="020B0604020202020204" pitchFamily="34" charset="0"/>
-              <a:buChar char="•"/>
-            </a:pPr>
             <a:r>
               <a:rPr lang="en-US" sz="2000" dirty="0" smtClean="0"/>
               <a:t>Awkward for deletion</a:t>
             </a:r>
-            <a:endParaRPr lang="en-US" sz="2000" dirty="0" smtClean="0"/>
           </a:p>
         </p:txBody>
       </p:sp>
@@ -4079,7 +4360,6 @@
               <a:rPr lang="en-US" sz="3500" b="1" dirty="0" smtClean="0"/>
               <a:t>Dynamic storage</a:t>
             </a:r>
-            <a:endParaRPr lang="en-US" sz="3500" b="1" dirty="0" smtClean="0"/>
           </a:p>
           <a:p>
             <a:pPr lvl="1"/>
@@ -4101,6 +4381,314 @@
     <p:extLst>
       <p:ext uri="{BB962C8B-B14F-4D97-AF65-F5344CB8AC3E}">
         <p14:creationId xmlns:p14="http://schemas.microsoft.com/office/powerpoint/2010/main" val="2844610513"/>
+      </p:ext>
+    </p:extLst>
+  </p:cSld>
+  <p:clrMapOvr>
+    <a:masterClrMapping/>
+  </p:clrMapOvr>
+  <p:timing>
+    <p:tnLst>
+      <p:par>
+        <p:cTn id="1" dur="indefinite" restart="never" nodeType="tmRoot"/>
+      </p:par>
+    </p:tnLst>
+  </p:timing>
+</p:sld>
+</file>
+
+<file path=ppt/slides/slide5.xml><?xml version="1.0" encoding="utf-8"?>
+<p:sld xmlns:a="http://schemas.openxmlformats.org/drawingml/2006/main" xmlns:r="http://schemas.openxmlformats.org/officeDocument/2006/relationships" xmlns:p="http://schemas.openxmlformats.org/presentationml/2006/main">
+  <p:cSld>
+    <p:spTree>
+      <p:nvGrpSpPr>
+        <p:cNvPr id="1" name=""/>
+        <p:cNvGrpSpPr/>
+        <p:nvPr/>
+      </p:nvGrpSpPr>
+      <p:grpSpPr>
+        <a:xfrm>
+          <a:off x="0" y="0"/>
+          <a:ext cx="0" cy="0"/>
+          <a:chOff x="0" y="0"/>
+          <a:chExt cx="0" cy="0"/>
+        </a:xfrm>
+      </p:grpSpPr>
+      <p:sp>
+        <p:nvSpPr>
+          <p:cNvPr id="5" name="Rectangle 4"/>
+          <p:cNvSpPr/>
+          <p:nvPr/>
+        </p:nvSpPr>
+        <p:spPr>
+          <a:xfrm>
+            <a:off x="6096" y="6096"/>
+            <a:ext cx="9144000" cy="1992853"/>
+          </a:xfrm>
+          <a:prstGeom prst="rect">
+            <a:avLst/>
+          </a:prstGeom>
+          <a:noFill/>
+        </p:spPr>
+        <p:txBody>
+          <a:bodyPr wrap="square" lIns="68580" tIns="34290" rIns="68580" bIns="34290">
+            <a:spAutoFit/>
+          </a:bodyPr>
+          <a:lstStyle/>
+          <a:p>
+            <a:pPr algn="ctr"/>
+            <a:endParaRPr lang="en-US" sz="4000" b="1" dirty="0" smtClean="0"/>
+          </a:p>
+          <a:p>
+            <a:pPr lvl="1"/>
+            <a:r>
+              <a:rPr lang="en-US" sz="3500" b="1" dirty="0" smtClean="0"/>
+              <a:t>Dynamic storage</a:t>
+            </a:r>
+          </a:p>
+          <a:p>
+            <a:pPr lvl="1"/>
+            <a:endParaRPr lang="en-US" sz="2500" dirty="0" smtClean="0"/>
+          </a:p>
+          <a:p>
+            <a:pPr marL="1657350" lvl="2" indent="-742950">
+              <a:buFont typeface="Arial" panose="020B0604020202020204" pitchFamily="34" charset="0"/>
+              <a:buChar char="•"/>
+            </a:pPr>
+            <a:r>
+              <a:rPr lang="en-US" sz="2500" dirty="0" smtClean="0"/>
+              <a:t>Linked lists</a:t>
+            </a:r>
+          </a:p>
+        </p:txBody>
+      </p:sp>
+    </p:spTree>
+    <p:extLst>
+      <p:ext uri="{BB962C8B-B14F-4D97-AF65-F5344CB8AC3E}">
+        <p14:creationId xmlns:p14="http://schemas.microsoft.com/office/powerpoint/2010/main" val="1303133792"/>
+      </p:ext>
+    </p:extLst>
+  </p:cSld>
+  <p:clrMapOvr>
+    <a:masterClrMapping/>
+  </p:clrMapOvr>
+  <p:timing>
+    <p:tnLst>
+      <p:par>
+        <p:cTn id="1" dur="indefinite" restart="never" nodeType="tmRoot"/>
+      </p:par>
+    </p:tnLst>
+  </p:timing>
+</p:sld>
+</file>
+
+<file path=ppt/slides/slide6.xml><?xml version="1.0" encoding="utf-8"?>
+<p:sld xmlns:a="http://schemas.openxmlformats.org/drawingml/2006/main" xmlns:r="http://schemas.openxmlformats.org/officeDocument/2006/relationships" xmlns:p="http://schemas.openxmlformats.org/presentationml/2006/main">
+  <p:cSld>
+    <p:spTree>
+      <p:nvGrpSpPr>
+        <p:cNvPr id="1" name=""/>
+        <p:cNvGrpSpPr/>
+        <p:nvPr/>
+      </p:nvGrpSpPr>
+      <p:grpSpPr>
+        <a:xfrm>
+          <a:off x="0" y="0"/>
+          <a:ext cx="0" cy="0"/>
+          <a:chOff x="0" y="0"/>
+          <a:chExt cx="0" cy="0"/>
+        </a:xfrm>
+      </p:grpSpPr>
+      <p:sp>
+        <p:nvSpPr>
+          <p:cNvPr id="5" name="Rectangle 4"/>
+          <p:cNvSpPr/>
+          <p:nvPr/>
+        </p:nvSpPr>
+        <p:spPr>
+          <a:xfrm>
+            <a:off x="6096" y="6096"/>
+            <a:ext cx="9144000" cy="2377574"/>
+          </a:xfrm>
+          <a:prstGeom prst="rect">
+            <a:avLst/>
+          </a:prstGeom>
+          <a:noFill/>
+        </p:spPr>
+        <p:txBody>
+          <a:bodyPr wrap="square" lIns="68580" tIns="34290" rIns="68580" bIns="34290">
+            <a:spAutoFit/>
+          </a:bodyPr>
+          <a:lstStyle/>
+          <a:p>
+            <a:pPr algn="ctr"/>
+            <a:endParaRPr lang="en-US" sz="4000" b="1" dirty="0" smtClean="0"/>
+          </a:p>
+          <a:p>
+            <a:pPr lvl="1"/>
+            <a:r>
+              <a:rPr lang="en-US" sz="3500" b="1" dirty="0" smtClean="0"/>
+              <a:t>Structure </a:t>
+            </a:r>
+            <a:r>
+              <a:rPr lang="mr-IN" sz="3500" b="1" dirty="0" smtClean="0"/>
+              <a:t>–</a:t>
+            </a:r>
+            <a:r>
+              <a:rPr lang="en-US" sz="3500" b="1" dirty="0" smtClean="0"/>
+              <a:t> Node object</a:t>
+            </a:r>
+            <a:endParaRPr lang="en-US" sz="3500" b="1" dirty="0" smtClean="0"/>
+          </a:p>
+          <a:p>
+            <a:pPr lvl="1"/>
+            <a:endParaRPr lang="en-US" sz="2500" dirty="0" smtClean="0"/>
+          </a:p>
+          <a:p>
+            <a:pPr marL="1657350" lvl="2" indent="-742950">
+              <a:buFont typeface="Arial" panose="020B0604020202020204" pitchFamily="34" charset="0"/>
+              <a:buChar char="•"/>
+            </a:pPr>
+            <a:r>
+              <a:rPr lang="en-US" sz="2500" dirty="0" smtClean="0"/>
+              <a:t>Node</a:t>
+            </a:r>
+          </a:p>
+          <a:p>
+            <a:pPr marL="2114550" lvl="3" indent="-742950">
+              <a:buFont typeface="Arial" panose="020B0604020202020204" pitchFamily="34" charset="0"/>
+              <a:buChar char="•"/>
+            </a:pPr>
+            <a:r>
+              <a:rPr lang="en-US" sz="2500" dirty="0" smtClean="0"/>
+              <a:t>Node</a:t>
+            </a:r>
+            <a:r>
+              <a:rPr lang="en-US" sz="2500" smtClean="0"/>
+              <a:t>^ Next;</a:t>
+            </a:r>
+            <a:endParaRPr lang="en-US" sz="2500" dirty="0" smtClean="0"/>
+          </a:p>
+        </p:txBody>
+      </p:sp>
+    </p:spTree>
+    <p:extLst>
+      <p:ext uri="{BB962C8B-B14F-4D97-AF65-F5344CB8AC3E}">
+        <p14:creationId xmlns:p14="http://schemas.microsoft.com/office/powerpoint/2010/main" val="1405091816"/>
+      </p:ext>
+    </p:extLst>
+  </p:cSld>
+  <p:clrMapOvr>
+    <a:masterClrMapping/>
+  </p:clrMapOvr>
+  <p:timing>
+    <p:tnLst>
+      <p:par>
+        <p:cTn id="1" dur="indefinite" restart="never" nodeType="tmRoot"/>
+      </p:par>
+    </p:tnLst>
+  </p:timing>
+</p:sld>
+</file>
+
+<file path=ppt/slides/slide7.xml><?xml version="1.0" encoding="utf-8"?>
+<p:sld xmlns:a="http://schemas.openxmlformats.org/drawingml/2006/main" xmlns:r="http://schemas.openxmlformats.org/officeDocument/2006/relationships" xmlns:p="http://schemas.openxmlformats.org/presentationml/2006/main">
+  <p:cSld>
+    <p:spTree>
+      <p:nvGrpSpPr>
+        <p:cNvPr id="1" name=""/>
+        <p:cNvGrpSpPr/>
+        <p:nvPr/>
+      </p:nvGrpSpPr>
+      <p:grpSpPr>
+        <a:xfrm>
+          <a:off x="0" y="0"/>
+          <a:ext cx="0" cy="0"/>
+          <a:chOff x="0" y="0"/>
+          <a:chExt cx="0" cy="0"/>
+        </a:xfrm>
+      </p:grpSpPr>
+      <p:sp>
+        <p:nvSpPr>
+          <p:cNvPr id="5" name="Rectangle 4"/>
+          <p:cNvSpPr/>
+          <p:nvPr/>
+        </p:nvSpPr>
+        <p:spPr>
+          <a:xfrm>
+            <a:off x="6096" y="6096"/>
+            <a:ext cx="9144000" cy="2762295"/>
+          </a:xfrm>
+          <a:prstGeom prst="rect">
+            <a:avLst/>
+          </a:prstGeom>
+          <a:noFill/>
+        </p:spPr>
+        <p:txBody>
+          <a:bodyPr wrap="square" lIns="68580" tIns="34290" rIns="68580" bIns="34290">
+            <a:spAutoFit/>
+          </a:bodyPr>
+          <a:lstStyle/>
+          <a:p>
+            <a:pPr algn="ctr"/>
+            <a:endParaRPr lang="en-US" sz="4000" b="1" dirty="0" smtClean="0"/>
+          </a:p>
+          <a:p>
+            <a:pPr lvl="1"/>
+            <a:r>
+              <a:rPr lang="en-US" sz="3500" b="1" dirty="0" smtClean="0"/>
+              <a:t>Structure </a:t>
+            </a:r>
+            <a:r>
+              <a:rPr lang="mr-IN" sz="3500" b="1" dirty="0" smtClean="0"/>
+              <a:t>–</a:t>
+            </a:r>
+            <a:r>
+              <a:rPr lang="en-US" sz="3500" b="1" dirty="0" smtClean="0"/>
+              <a:t> Linked list</a:t>
+            </a:r>
+            <a:endParaRPr lang="en-US" sz="3500" b="1" dirty="0" smtClean="0"/>
+          </a:p>
+          <a:p>
+            <a:pPr lvl="1"/>
+            <a:endParaRPr lang="en-US" sz="2500" dirty="0" smtClean="0"/>
+          </a:p>
+          <a:p>
+            <a:pPr marL="1657350" lvl="2" indent="-742950">
+              <a:buFont typeface="Arial" panose="020B0604020202020204" pitchFamily="34" charset="0"/>
+              <a:buChar char="•"/>
+            </a:pPr>
+            <a:r>
+              <a:rPr lang="en-US" sz="2500" dirty="0" smtClean="0"/>
+              <a:t>Linked list</a:t>
+            </a:r>
+          </a:p>
+          <a:p>
+            <a:pPr marL="2114550" lvl="3" indent="-742950">
+              <a:buFont typeface="Arial" panose="020B0604020202020204" pitchFamily="34" charset="0"/>
+              <a:buChar char="•"/>
+            </a:pPr>
+            <a:r>
+              <a:rPr lang="en-US" sz="2500" dirty="0" smtClean="0"/>
+              <a:t>Node^ head;</a:t>
+            </a:r>
+          </a:p>
+          <a:p>
+            <a:pPr marL="2114550" lvl="3" indent="-742950">
+              <a:buFont typeface="Arial" panose="020B0604020202020204" pitchFamily="34" charset="0"/>
+              <a:buChar char="•"/>
+            </a:pPr>
+            <a:r>
+              <a:rPr lang="en-US" sz="2500" dirty="0" smtClean="0"/>
+              <a:t>Node^ tail;</a:t>
+            </a:r>
+          </a:p>
+        </p:txBody>
+      </p:sp>
+    </p:spTree>
+    <p:extLst>
+      <p:ext uri="{BB962C8B-B14F-4D97-AF65-F5344CB8AC3E}">
+        <p14:creationId xmlns:p14="http://schemas.microsoft.com/office/powerpoint/2010/main" val="918256471"/>
       </p:ext>
     </p:extLst>
   </p:cSld>

</xml_diff>

<commit_message>
Update PP - Linked Lists
</commit_message>
<xml_diff>
--- a/Programming 4/03.1 Linked Lists/03.1 Linked Lists.pptx
+++ b/Programming 4/03.1 Linked Lists/03.1 Linked Lists.pptx
@@ -5,7 +5,7 @@
     <p:sldMasterId id="2147483648" r:id="rId1"/>
   </p:sldMasterIdLst>
   <p:notesMasterIdLst>
-    <p:notesMasterId r:id="rId34"/>
+    <p:notesMasterId r:id="rId35"/>
   </p:notesMasterIdLst>
   <p:sldIdLst>
     <p:sldId id="256" r:id="rId2"/>
@@ -31,15 +31,16 @@
     <p:sldId id="278" r:id="rId22"/>
     <p:sldId id="279" r:id="rId23"/>
     <p:sldId id="280" r:id="rId24"/>
-    <p:sldId id="281" r:id="rId25"/>
-    <p:sldId id="282" r:id="rId26"/>
-    <p:sldId id="283" r:id="rId27"/>
-    <p:sldId id="284" r:id="rId28"/>
-    <p:sldId id="285" r:id="rId29"/>
-    <p:sldId id="286" r:id="rId30"/>
-    <p:sldId id="287" r:id="rId31"/>
-    <p:sldId id="289" r:id="rId32"/>
-    <p:sldId id="290" r:id="rId33"/>
+    <p:sldId id="291" r:id="rId25"/>
+    <p:sldId id="281" r:id="rId26"/>
+    <p:sldId id="282" r:id="rId27"/>
+    <p:sldId id="283" r:id="rId28"/>
+    <p:sldId id="284" r:id="rId29"/>
+    <p:sldId id="285" r:id="rId30"/>
+    <p:sldId id="286" r:id="rId31"/>
+    <p:sldId id="287" r:id="rId32"/>
+    <p:sldId id="289" r:id="rId33"/>
+    <p:sldId id="290" r:id="rId34"/>
   </p:sldIdLst>
   <p:sldSz cx="9144000" cy="6858000" type="screen4x3"/>
   <p:notesSz cx="6858000" cy="9144000"/>
@@ -555,14 +556,6 @@
               <a:buFont typeface="Arial" charset="0"/>
               <a:buChar char="•"/>
             </a:pPr>
-            <a:r>
-              <a:rPr lang="en-US" dirty="0" smtClean="0"/>
-              <a:t>Objects – enemies, treasure, </a:t>
-            </a:r>
-            <a:r>
-              <a:rPr lang="en-US" dirty="0" err="1" smtClean="0"/>
-              <a:t>powerups</a:t>
-            </a:r>
             <a:endParaRPr lang="en-US" dirty="0" smtClean="0"/>
           </a:p>
         </p:txBody>
@@ -651,78 +644,6 @@
               <a:buFont typeface="Arial" panose="020B0604020202020204" pitchFamily="34" charset="0"/>
               <a:buChar char="•"/>
             </a:pPr>
-            <a:r>
-              <a:rPr lang="en-US" dirty="0" smtClean="0"/>
-              <a:t>nodeWalker</a:t>
-            </a:r>
-            <a:r>
-              <a:rPr lang="en-US" baseline="0" dirty="0" smtClean="0"/>
-              <a:t> is a pointer</a:t>
-            </a:r>
-          </a:p>
-          <a:p>
-            <a:pPr marL="171450" indent="-171450">
-              <a:buFont typeface="Arial" panose="020B0604020202020204" pitchFamily="34" charset="0"/>
-              <a:buChar char="•"/>
-            </a:pPr>
-            <a:endParaRPr lang="en-US" baseline="0" dirty="0" smtClean="0"/>
-          </a:p>
-          <a:p>
-            <a:pPr marL="171450" indent="-171450">
-              <a:buFont typeface="Arial" panose="020B0604020202020204" pitchFamily="34" charset="0"/>
-              <a:buChar char="•"/>
-            </a:pPr>
-            <a:r>
-              <a:rPr lang="en-US" baseline="0" dirty="0" smtClean="0"/>
-              <a:t>It is 32 or 64 bits of memory that can hold a memory address, which should be the memory address of a Node</a:t>
-            </a:r>
-          </a:p>
-          <a:p>
-            <a:pPr marL="171450" indent="-171450">
-              <a:buFont typeface="Arial" panose="020B0604020202020204" pitchFamily="34" charset="0"/>
-              <a:buChar char="•"/>
-            </a:pPr>
-            <a:endParaRPr lang="en-US" baseline="0" dirty="0" smtClean="0"/>
-          </a:p>
-          <a:p>
-            <a:pPr marL="171450" indent="-171450">
-              <a:buFont typeface="Arial" panose="020B0604020202020204" pitchFamily="34" charset="0"/>
-              <a:buChar char="•"/>
-            </a:pPr>
-            <a:r>
-              <a:rPr lang="en-US" baseline="0" dirty="0" smtClean="0"/>
-              <a:t>It is not a Node</a:t>
-            </a:r>
-          </a:p>
-          <a:p>
-            <a:pPr marL="171450" indent="-171450">
-              <a:buFont typeface="Arial" panose="020B0604020202020204" pitchFamily="34" charset="0"/>
-              <a:buChar char="•"/>
-            </a:pPr>
-            <a:endParaRPr lang="en-US" baseline="0" dirty="0" smtClean="0"/>
-          </a:p>
-          <a:p>
-            <a:pPr marL="171450" indent="-171450">
-              <a:buFont typeface="Arial" panose="020B0604020202020204" pitchFamily="34" charset="0"/>
-              <a:buChar char="•"/>
-            </a:pPr>
-            <a:r>
-              <a:rPr lang="en-US" baseline="0" dirty="0" smtClean="0"/>
-              <a:t>It doesn’t have any of the properties of a Node, so what does it mean to say nodeWalker-&gt;Next?</a:t>
-            </a:r>
-          </a:p>
-          <a:p>
-            <a:pPr marL="171450" indent="-171450">
-              <a:buFont typeface="Arial" panose="020B0604020202020204" pitchFamily="34" charset="0"/>
-              <a:buChar char="•"/>
-            </a:pPr>
-            <a:endParaRPr lang="en-US" baseline="0" dirty="0" smtClean="0"/>
-          </a:p>
-          <a:p>
-            <a:pPr marL="171450" indent="-171450">
-              <a:buFont typeface="Arial" panose="020B0604020202020204" pitchFamily="34" charset="0"/>
-              <a:buChar char="•"/>
-            </a:pPr>
             <a:endParaRPr lang="en-US" dirty="0" smtClean="0"/>
           </a:p>
         </p:txBody>
@@ -811,27 +732,6 @@
               <a:buFont typeface="Arial" panose="020B0604020202020204" pitchFamily="34" charset="0"/>
               <a:buChar char="•"/>
             </a:pPr>
-            <a:r>
-              <a:rPr lang="en-US" dirty="0" smtClean="0"/>
-              <a:t>When</a:t>
-            </a:r>
-            <a:r>
-              <a:rPr lang="en-US" baseline="0" dirty="0" smtClean="0"/>
-              <a:t> we assign that value to nodeWalker, where is he now pointing? To the guy his guy was pointing to. That is, he has taken one step down the chain</a:t>
-            </a:r>
-          </a:p>
-          <a:p>
-            <a:pPr marL="171450" indent="-171450">
-              <a:buFont typeface="Arial" panose="020B0604020202020204" pitchFamily="34" charset="0"/>
-              <a:buChar char="•"/>
-            </a:pPr>
-            <a:endParaRPr lang="en-US" baseline="0" dirty="0" smtClean="0"/>
-          </a:p>
-          <a:p>
-            <a:pPr marL="171450" indent="-171450">
-              <a:buFont typeface="Arial" panose="020B0604020202020204" pitchFamily="34" charset="0"/>
-              <a:buChar char="•"/>
-            </a:pPr>
             <a:endParaRPr lang="en-US" dirty="0" smtClean="0"/>
           </a:p>
         </p:txBody>
@@ -920,31 +820,6 @@
               <a:buFont typeface="Arial" panose="020B0604020202020204" pitchFamily="34" charset="0"/>
               <a:buChar char="•"/>
             </a:pPr>
-            <a:r>
-              <a:rPr lang="en-US" dirty="0" smtClean="0"/>
-              <a:t>nodeWalker</a:t>
-            </a:r>
-            <a:r>
-              <a:rPr lang="en-US" baseline="0" dirty="0" smtClean="0"/>
-              <a:t> is pointing to node1</a:t>
-            </a:r>
-          </a:p>
-          <a:p>
-            <a:pPr marL="171450" indent="-171450">
-              <a:buFont typeface="Arial" panose="020B0604020202020204" pitchFamily="34" charset="0"/>
-              <a:buChar char="•"/>
-            </a:pPr>
-            <a:endParaRPr lang="en-US" baseline="0" dirty="0" smtClean="0"/>
-          </a:p>
-          <a:p>
-            <a:pPr marL="171450" indent="-171450">
-              <a:buFont typeface="Arial" panose="020B0604020202020204" pitchFamily="34" charset="0"/>
-              <a:buChar char="•"/>
-            </a:pPr>
-            <a:r>
-              <a:rPr lang="en-US" baseline="0" dirty="0" smtClean="0"/>
-              <a:t>The Next of node1 is the address of node2</a:t>
-            </a:r>
             <a:endParaRPr lang="en-US" dirty="0" smtClean="0"/>
           </a:p>
         </p:txBody>
@@ -1033,82 +908,6 @@
               <a:buFont typeface="Arial" panose="020B0604020202020204" pitchFamily="34" charset="0"/>
               <a:buChar char="•"/>
             </a:pPr>
-            <a:r>
-              <a:rPr lang="en-US" dirty="0" smtClean="0"/>
-              <a:t>nodeWalker = nodeWalker-&gt;Next</a:t>
-            </a:r>
-            <a:r>
-              <a:rPr lang="en-US" baseline="0" dirty="0" smtClean="0"/>
-              <a:t> points nodeWalker at node2</a:t>
-            </a:r>
-          </a:p>
-          <a:p>
-            <a:pPr marL="171450" indent="-171450">
-              <a:buFont typeface="Arial" panose="020B0604020202020204" pitchFamily="34" charset="0"/>
-              <a:buChar char="•"/>
-            </a:pPr>
-            <a:endParaRPr lang="en-US" baseline="0" dirty="0" smtClean="0"/>
-          </a:p>
-          <a:p>
-            <a:pPr marL="171450" indent="-171450">
-              <a:buFont typeface="Arial" panose="020B0604020202020204" pitchFamily="34" charset="0"/>
-              <a:buChar char="•"/>
-            </a:pPr>
-            <a:r>
-              <a:rPr lang="en-US" baseline="0" dirty="0" smtClean="0"/>
-              <a:t>What if we called nodeWalker-&gt;Next again?</a:t>
-            </a:r>
-          </a:p>
-          <a:p>
-            <a:pPr marL="171450" indent="-171450">
-              <a:buFont typeface="Arial" panose="020B0604020202020204" pitchFamily="34" charset="0"/>
-              <a:buChar char="•"/>
-            </a:pPr>
-            <a:endParaRPr lang="en-US" baseline="0" dirty="0" smtClean="0"/>
-          </a:p>
-          <a:p>
-            <a:pPr marL="171450" indent="-171450">
-              <a:buFont typeface="Arial" panose="020B0604020202020204" pitchFamily="34" charset="0"/>
-              <a:buChar char="•"/>
-            </a:pPr>
-            <a:r>
-              <a:rPr lang="en-US" baseline="0" dirty="0" smtClean="0"/>
-              <a:t>Node2, being at the end of the list, his Next = nullptr</a:t>
-            </a:r>
-          </a:p>
-          <a:p>
-            <a:pPr marL="171450" indent="-171450">
-              <a:buFont typeface="Arial" panose="020B0604020202020204" pitchFamily="34" charset="0"/>
-              <a:buChar char="•"/>
-            </a:pPr>
-            <a:endParaRPr lang="en-US" baseline="0" dirty="0" smtClean="0"/>
-          </a:p>
-          <a:p>
-            <a:pPr marL="171450" indent="-171450">
-              <a:buFont typeface="Arial" panose="020B0604020202020204" pitchFamily="34" charset="0"/>
-              <a:buChar char="•"/>
-            </a:pPr>
-            <a:r>
-              <a:rPr lang="en-US" baseline="0" dirty="0" smtClean="0"/>
-              <a:t>So if you say nodeWalker = nodeWalker-&gt;Next again, nodeWalker is nullptr</a:t>
-            </a:r>
-          </a:p>
-          <a:p>
-            <a:pPr marL="171450" indent="-171450">
-              <a:buFont typeface="Arial" panose="020B0604020202020204" pitchFamily="34" charset="0"/>
-              <a:buChar char="•"/>
-            </a:pPr>
-            <a:endParaRPr lang="en-US" baseline="0" dirty="0" smtClean="0"/>
-          </a:p>
-          <a:p>
-            <a:pPr marL="171450" indent="-171450">
-              <a:buFont typeface="Arial" panose="020B0604020202020204" pitchFamily="34" charset="0"/>
-              <a:buChar char="•"/>
-            </a:pPr>
-            <a:r>
-              <a:rPr lang="en-US" baseline="0" dirty="0" smtClean="0"/>
-              <a:t>That’s how you drop/break out of the loop</a:t>
-            </a:r>
             <a:endParaRPr lang="en-US" dirty="0" smtClean="0"/>
           </a:p>
         </p:txBody>
@@ -1197,90 +996,6 @@
               <a:buFont typeface="Arial" panose="020B0604020202020204" pitchFamily="34" charset="0"/>
               <a:buChar char="•"/>
             </a:pPr>
-            <a:r>
-              <a:rPr lang="en-US" dirty="0" smtClean="0"/>
-              <a:t>How</a:t>
-            </a:r>
-            <a:r>
-              <a:rPr lang="en-US" baseline="0" dirty="0" smtClean="0"/>
-              <a:t> can we talk to the current last node? Tail is pointing to him</a:t>
-            </a:r>
-          </a:p>
-          <a:p>
-            <a:pPr marL="171450" indent="-171450">
-              <a:buFont typeface="Arial" panose="020B0604020202020204" pitchFamily="34" charset="0"/>
-              <a:buChar char="•"/>
-            </a:pPr>
-            <a:endParaRPr lang="en-US" baseline="0" dirty="0" smtClean="0"/>
-          </a:p>
-          <a:p>
-            <a:pPr marL="171450" indent="-171450">
-              <a:buFont typeface="Arial" panose="020B0604020202020204" pitchFamily="34" charset="0"/>
-              <a:buChar char="•"/>
-            </a:pPr>
-            <a:r>
-              <a:rPr lang="en-US" baseline="0" dirty="0" smtClean="0"/>
-              <a:t>Remember, tail-&gt;Next means the Next of the guy tail is pointing to</a:t>
-            </a:r>
-          </a:p>
-          <a:p>
-            <a:pPr marL="171450" indent="-171450">
-              <a:buFont typeface="Arial" panose="020B0604020202020204" pitchFamily="34" charset="0"/>
-              <a:buChar char="•"/>
-            </a:pPr>
-            <a:endParaRPr lang="en-US" baseline="0" dirty="0" smtClean="0"/>
-          </a:p>
-          <a:p>
-            <a:pPr marL="171450" indent="-171450">
-              <a:buFont typeface="Arial" panose="020B0604020202020204" pitchFamily="34" charset="0"/>
-              <a:buChar char="•"/>
-            </a:pPr>
-            <a:r>
-              <a:rPr lang="en-US" baseline="0" dirty="0" smtClean="0"/>
-              <a:t>What if there aren’t any nodes in the list?</a:t>
-            </a:r>
-          </a:p>
-          <a:p>
-            <a:pPr marL="628650" lvl="1" indent="-171450">
-              <a:buFont typeface="Arial" panose="020B0604020202020204" pitchFamily="34" charset="0"/>
-              <a:buChar char="•"/>
-            </a:pPr>
-            <a:r>
-              <a:rPr lang="en-US" baseline="0" dirty="0" smtClean="0"/>
-              <a:t>What is the value of tail? Nullptr</a:t>
-            </a:r>
-          </a:p>
-          <a:p>
-            <a:pPr marL="628650" lvl="1" indent="-171450">
-              <a:buFont typeface="Arial" panose="020B0604020202020204" pitchFamily="34" charset="0"/>
-              <a:buChar char="•"/>
-            </a:pPr>
-            <a:r>
-              <a:rPr lang="en-US" baseline="0" dirty="0" smtClean="0"/>
-              <a:t>What will happen when you say tail-&gt;Next? Boom!!!</a:t>
-            </a:r>
-          </a:p>
-          <a:p>
-            <a:pPr marL="628650" lvl="1" indent="-171450">
-              <a:buFont typeface="Arial" panose="020B0604020202020204" pitchFamily="34" charset="0"/>
-              <a:buChar char="•"/>
-            </a:pPr>
-            <a:r>
-              <a:rPr lang="en-US" dirty="0" smtClean="0"/>
-              <a:t>What can you do? </a:t>
-            </a:r>
-            <a:r>
-              <a:rPr lang="en-US" dirty="0" err="1" smtClean="0"/>
-              <a:t>Recognise</a:t>
-            </a:r>
-            <a:r>
-              <a:rPr lang="en-US" dirty="0" smtClean="0"/>
-              <a:t> that this is a special</a:t>
-            </a:r>
-            <a:r>
-              <a:rPr lang="en-US" baseline="0" dirty="0" smtClean="0"/>
-              <a:t> case. This is very common. We have the ordinary thing we do most of the time and we have the boundary cases</a:t>
-            </a:r>
             <a:endParaRPr lang="en-US" dirty="0" smtClean="0"/>
           </a:p>
         </p:txBody>
@@ -1369,14 +1084,6 @@
               <a:buFont typeface="Arial" panose="020B0604020202020204" pitchFamily="34" charset="0"/>
               <a:buChar char="•"/>
             </a:pPr>
-            <a:r>
-              <a:rPr lang="en-US" dirty="0" smtClean="0"/>
-              <a:t>What flow of control structure will we</a:t>
-            </a:r>
-            <a:r>
-              <a:rPr lang="en-US" baseline="0" dirty="0" smtClean="0"/>
-              <a:t> nee? If else statement</a:t>
-            </a:r>
             <a:endParaRPr lang="en-US" dirty="0" smtClean="0"/>
           </a:p>
         </p:txBody>
@@ -1656,15 +1363,31 @@
           <a:bodyPr/>
           <a:lstStyle/>
           <a:p>
-            <a:pPr marL="171450" indent="-171450">
-              <a:buFont typeface="Arial" charset="0"/>
+            <a:pPr marL="171450" marR="0" lvl="0" indent="-171450" algn="l" defTabSz="914400" rtl="0" eaLnBrk="1" fontAlgn="auto" latinLnBrk="0" hangingPunct="1">
+              <a:lnSpc>
+                <a:spcPct val="100000"/>
+              </a:lnSpc>
+              <a:spcBef>
+                <a:spcPts val="0"/>
+              </a:spcBef>
+              <a:spcAft>
+                <a:spcPts val="0"/>
+              </a:spcAft>
+              <a:buClrTx/>
+              <a:buSzTx/>
+              <a:buFont typeface="Arial" panose="020B0604020202020204" pitchFamily="34" charset="0"/>
               <a:buChar char="•"/>
+              <a:tabLst/>
+              <a:defRPr/>
             </a:pPr>
             <a:r>
               <a:rPr lang="en-US" dirty="0" smtClean="0"/>
               <a:t>To delete monster2</a:t>
             </a:r>
-            <a:endParaRPr lang="en-US" baseline="0" dirty="0" smtClean="0"/>
+            <a:r>
+              <a:rPr lang="en-US" baseline="0" dirty="0" smtClean="0"/>
+              <a:t>…simply set</a:t>
+            </a:r>
           </a:p>
           <a:p>
             <a:pPr marL="0" indent="0">
@@ -1854,38 +1577,6 @@
               <a:buFont typeface="Arial" charset="0"/>
               <a:buChar char="•"/>
             </a:pPr>
-            <a:r>
-              <a:rPr lang="en-US" dirty="0" smtClean="0"/>
-              <a:t>The</a:t>
-            </a:r>
-            <a:r>
-              <a:rPr lang="en-US" baseline="0" dirty="0" smtClean="0"/>
-              <a:t> size of the array has to be declared in advanced</a:t>
-            </a:r>
-          </a:p>
-          <a:p>
-            <a:pPr marL="628650" lvl="1" indent="-171450">
-              <a:buFont typeface="Arial" charset="0"/>
-              <a:buChar char="•"/>
-            </a:pPr>
-            <a:r>
-              <a:rPr lang="en-US" baseline="0" dirty="0" smtClean="0"/>
-              <a:t>Causes problems such as the array is too small and can’t hold enough items</a:t>
-            </a:r>
-          </a:p>
-          <a:p>
-            <a:pPr marL="628650" lvl="1" indent="-171450">
-              <a:buFont typeface="Arial" charset="0"/>
-              <a:buChar char="•"/>
-            </a:pPr>
-            <a:r>
-              <a:rPr lang="en-US" baseline="0" dirty="0" smtClean="0"/>
-              <a:t>Or the array is too large and </a:t>
-            </a:r>
-            <a:r>
-              <a:rPr lang="en-US" baseline="0" smtClean="0"/>
-              <a:t>is wasteful</a:t>
-            </a:r>
             <a:endParaRPr lang="en-US" dirty="0" smtClean="0"/>
           </a:p>
         </p:txBody>
@@ -2210,17 +1901,11 @@
             </a:pPr>
             <a:r>
               <a:rPr lang="en-US" baseline="0" dirty="0" smtClean="0"/>
-              <a:t>NodeWalker = head</a:t>
-            </a:r>
-          </a:p>
-          <a:p>
-            <a:pPr marL="171450" indent="-171450">
-              <a:buFont typeface="Arial" charset="0"/>
-              <a:buChar char="•"/>
-            </a:pPr>
+              <a:t>NodeWalker = </a:t>
+            </a:r>
             <a:r>
               <a:rPr lang="en-US" baseline="0" dirty="0" smtClean="0"/>
-              <a:t>Move along</a:t>
+              <a:t>head</a:t>
             </a:r>
             <a:endParaRPr lang="en-US" baseline="0" dirty="0" smtClean="0"/>
           </a:p>
@@ -2312,9 +1997,12 @@
             </a:pPr>
             <a:r>
               <a:rPr lang="en-US" baseline="0" dirty="0" smtClean="0"/>
-              <a:t>Move along</a:t>
-            </a:r>
-            <a:endParaRPr lang="en-US" baseline="0" dirty="0" smtClean="0"/>
+              <a:t>Move </a:t>
+            </a:r>
+            <a:r>
+              <a:rPr lang="en-US" baseline="0" dirty="0" smtClean="0"/>
+              <a:t>along</a:t>
+            </a:r>
           </a:p>
         </p:txBody>
       </p:sp>
@@ -2344,7 +2032,7 @@
     </p:spTree>
     <p:extLst>
       <p:ext uri="{BB962C8B-B14F-4D97-AF65-F5344CB8AC3E}">
-        <p14:creationId xmlns:p14="http://schemas.microsoft.com/office/powerpoint/2010/main" val="1280633022"/>
+        <p14:creationId xmlns:p14="http://schemas.microsoft.com/office/powerpoint/2010/main" val="835288237"/>
       </p:ext>
     </p:extLst>
   </p:cSld>
@@ -2432,7 +2120,7 @@
     </p:spTree>
     <p:extLst>
       <p:ext uri="{BB962C8B-B14F-4D97-AF65-F5344CB8AC3E}">
-        <p14:creationId xmlns:p14="http://schemas.microsoft.com/office/powerpoint/2010/main" val="2540111499"/>
+        <p14:creationId xmlns:p14="http://schemas.microsoft.com/office/powerpoint/2010/main" val="1280633022"/>
       </p:ext>
     </p:extLst>
   </p:cSld>
@@ -2520,7 +2208,7 @@
     </p:spTree>
     <p:extLst>
       <p:ext uri="{BB962C8B-B14F-4D97-AF65-F5344CB8AC3E}">
-        <p14:creationId xmlns:p14="http://schemas.microsoft.com/office/powerpoint/2010/main" val="2431294815"/>
+        <p14:creationId xmlns:p14="http://schemas.microsoft.com/office/powerpoint/2010/main" val="2540111499"/>
       </p:ext>
     </p:extLst>
   </p:cSld>
@@ -2608,7 +2296,7 @@
     </p:spTree>
     <p:extLst>
       <p:ext uri="{BB962C8B-B14F-4D97-AF65-F5344CB8AC3E}">
-        <p14:creationId xmlns:p14="http://schemas.microsoft.com/office/powerpoint/2010/main" val="4120568129"/>
+        <p14:creationId xmlns:p14="http://schemas.microsoft.com/office/powerpoint/2010/main" val="2431294815"/>
       </p:ext>
     </p:extLst>
   </p:cSld>
@@ -2666,78 +2354,6 @@
               <a:buFont typeface="Arial" charset="0"/>
               <a:buChar char="•"/>
             </a:pPr>
-            <a:r>
-              <a:rPr lang="en-US" baseline="0" dirty="0" smtClean="0"/>
-              <a:t>Note that there’s actually more than we have here</a:t>
-            </a:r>
-          </a:p>
-          <a:p>
-            <a:pPr marL="171450" indent="-171450">
-              <a:buFont typeface="Arial" charset="0"/>
-              <a:buChar char="•"/>
-            </a:pPr>
-            <a:endParaRPr lang="en-US" baseline="0" dirty="0" smtClean="0"/>
-          </a:p>
-          <a:p>
-            <a:pPr marL="171450" indent="-171450">
-              <a:buFont typeface="Arial" charset="0"/>
-              <a:buChar char="•"/>
-            </a:pPr>
-            <a:r>
-              <a:rPr lang="en-US" baseline="0" dirty="0" smtClean="0"/>
-              <a:t>We need to deal with the case where we are asked to delete a node that isn’t actually in the list, and there are boundary cases, for example, when you are deleting the first node, or deleting from a list that only has one node in it. Then there is no node before</a:t>
-            </a:r>
-          </a:p>
-          <a:p>
-            <a:pPr marL="171450" indent="-171450">
-              <a:buFont typeface="Arial" charset="0"/>
-              <a:buChar char="•"/>
-            </a:pPr>
-            <a:endParaRPr lang="en-US" baseline="0" dirty="0" smtClean="0"/>
-          </a:p>
-          <a:p>
-            <a:pPr marL="171450" indent="-171450">
-              <a:buFont typeface="Arial" charset="0"/>
-              <a:buChar char="•"/>
-            </a:pPr>
-            <a:r>
-              <a:rPr lang="en-US" baseline="0" dirty="0" smtClean="0"/>
-              <a:t>When we build our own linked list, we will look at these, and there is a detailed handout to help you</a:t>
-            </a:r>
-          </a:p>
-          <a:p>
-            <a:pPr marL="171450" indent="-171450">
-              <a:buFont typeface="Arial" charset="0"/>
-              <a:buChar char="•"/>
-            </a:pPr>
-            <a:endParaRPr lang="en-US" baseline="0" dirty="0" smtClean="0"/>
-          </a:p>
-          <a:p>
-            <a:pPr marL="171450" indent="-171450">
-              <a:buFont typeface="Arial" charset="0"/>
-              <a:buChar char="•"/>
-            </a:pPr>
-            <a:r>
-              <a:rPr lang="en-US" baseline="0" dirty="0" smtClean="0"/>
-              <a:t>For now, just make sure you understand the logic of this basic case of deleting a node from the middle of the list</a:t>
-            </a:r>
-          </a:p>
-          <a:p>
-            <a:pPr marL="171450" indent="-171450">
-              <a:buFont typeface="Arial" charset="0"/>
-              <a:buChar char="•"/>
-            </a:pPr>
-            <a:endParaRPr lang="en-US" baseline="0" dirty="0" smtClean="0"/>
-          </a:p>
-          <a:p>
-            <a:pPr marL="171450" indent="-171450">
-              <a:buFont typeface="Arial" charset="0"/>
-              <a:buChar char="•"/>
-            </a:pPr>
-            <a:r>
-              <a:rPr lang="en-US" baseline="0" dirty="0" smtClean="0"/>
-              <a:t>Use a similar approach for adding a node to an ordered list</a:t>
-            </a:r>
             <a:endParaRPr lang="en-US" baseline="0" dirty="0" smtClean="0"/>
           </a:p>
         </p:txBody>
@@ -2768,7 +2384,7 @@
     </p:spTree>
     <p:extLst>
       <p:ext uri="{BB962C8B-B14F-4D97-AF65-F5344CB8AC3E}">
-        <p14:creationId xmlns:p14="http://schemas.microsoft.com/office/powerpoint/2010/main" val="100774603"/>
+        <p14:creationId xmlns:p14="http://schemas.microsoft.com/office/powerpoint/2010/main" val="4120568129"/>
       </p:ext>
     </p:extLst>
   </p:cSld>
@@ -2856,7 +2472,7 @@
     </p:spTree>
     <p:extLst>
       <p:ext uri="{BB962C8B-B14F-4D97-AF65-F5344CB8AC3E}">
-        <p14:creationId xmlns:p14="http://schemas.microsoft.com/office/powerpoint/2010/main" val="1545097013"/>
+        <p14:creationId xmlns:p14="http://schemas.microsoft.com/office/powerpoint/2010/main" val="100774603"/>
       </p:ext>
     </p:extLst>
   </p:cSld>
@@ -2916,13 +2532,6 @@
             </a:pPr>
             <a:endParaRPr lang="en-US" baseline="0" dirty="0" smtClean="0"/>
           </a:p>
-          <a:p>
-            <a:pPr marL="171450" indent="-171450">
-              <a:buFont typeface="Arial" charset="0"/>
-              <a:buChar char="•"/>
-            </a:pPr>
-            <a:endParaRPr lang="en-US" baseline="0" dirty="0" smtClean="0"/>
-          </a:p>
         </p:txBody>
       </p:sp>
       <p:sp>
@@ -2951,7 +2560,7 @@
     </p:spTree>
     <p:extLst>
       <p:ext uri="{BB962C8B-B14F-4D97-AF65-F5344CB8AC3E}">
-        <p14:creationId xmlns:p14="http://schemas.microsoft.com/office/powerpoint/2010/main" val="2559441040"/>
+        <p14:creationId xmlns:p14="http://schemas.microsoft.com/office/powerpoint/2010/main" val="1545097013"/>
       </p:ext>
     </p:extLst>
   </p:cSld>
@@ -3009,75 +2618,6 @@
               <a:buFont typeface="Arial" charset="0"/>
               <a:buChar char="•"/>
             </a:pPr>
-            <a:r>
-              <a:rPr lang="en-US" dirty="0" smtClean="0"/>
-              <a:t>You can add and remove items from your list as required – this</a:t>
-            </a:r>
-            <a:r>
-              <a:rPr lang="en-US" baseline="0" dirty="0" smtClean="0"/>
-              <a:t> happens during the lifetime of the program</a:t>
-            </a:r>
-          </a:p>
-          <a:p>
-            <a:pPr marL="171450" indent="-171450">
-              <a:buFont typeface="Arial" charset="0"/>
-              <a:buChar char="•"/>
-            </a:pPr>
-            <a:endParaRPr lang="en-US" baseline="0" dirty="0" smtClean="0"/>
-          </a:p>
-          <a:p>
-            <a:pPr marL="171450" indent="-171450">
-              <a:buFont typeface="Arial" charset="0"/>
-              <a:buChar char="•"/>
-            </a:pPr>
-            <a:r>
-              <a:rPr lang="en-US" baseline="0" dirty="0" smtClean="0"/>
-              <a:t>An item contains a link to another item of the same type</a:t>
-            </a:r>
-          </a:p>
-          <a:p>
-            <a:pPr marL="628650" lvl="1" indent="-171450">
-              <a:buFont typeface="Arial" charset="0"/>
-              <a:buChar char="•"/>
-            </a:pPr>
-            <a:r>
-              <a:rPr lang="en-US" baseline="0" dirty="0" smtClean="0"/>
-              <a:t>Strings, characters, numbers, items can be sorted, unsorted, duplicate or unique</a:t>
-            </a:r>
-          </a:p>
-          <a:p>
-            <a:pPr marL="171450" indent="-171450">
-              <a:buFont typeface="Arial" charset="0"/>
-              <a:buChar char="•"/>
-            </a:pPr>
-            <a:endParaRPr lang="en-US" baseline="0" dirty="0" smtClean="0"/>
-          </a:p>
-          <a:p>
-            <a:pPr marL="171450" indent="-171450">
-              <a:buFont typeface="Arial" charset="0"/>
-              <a:buChar char="•"/>
-            </a:pPr>
-            <a:r>
-              <a:rPr lang="en-US" baseline="0" dirty="0" smtClean="0"/>
-              <a:t>You can build a chain of items</a:t>
-            </a:r>
-          </a:p>
-          <a:p>
-            <a:pPr marL="171450" indent="-171450">
-              <a:buFont typeface="Arial" charset="0"/>
-              <a:buChar char="•"/>
-            </a:pPr>
-            <a:endParaRPr lang="en-US" baseline="0" dirty="0" smtClean="0"/>
-          </a:p>
-          <a:p>
-            <a:pPr marL="171450" indent="-171450">
-              <a:buFont typeface="Arial" charset="0"/>
-              <a:buChar char="•"/>
-            </a:pPr>
-            <a:r>
-              <a:rPr lang="en-US" baseline="0" dirty="0" smtClean="0"/>
-              <a:t>All data operations (add, delete, search, etc.) are possible on linked lists</a:t>
-            </a:r>
             <a:endParaRPr lang="en-US" dirty="0" smtClean="0"/>
           </a:p>
         </p:txBody>
@@ -3168,6 +2708,13 @@
             </a:pPr>
             <a:endParaRPr lang="en-US" baseline="0" dirty="0" smtClean="0"/>
           </a:p>
+          <a:p>
+            <a:pPr marL="171450" indent="-171450">
+              <a:buFont typeface="Arial" charset="0"/>
+              <a:buChar char="•"/>
+            </a:pPr>
+            <a:endParaRPr lang="en-US" baseline="0" dirty="0" smtClean="0"/>
+          </a:p>
         </p:txBody>
       </p:sp>
       <p:sp>
@@ -3196,7 +2743,7 @@
     </p:spTree>
     <p:extLst>
       <p:ext uri="{BB962C8B-B14F-4D97-AF65-F5344CB8AC3E}">
-        <p14:creationId xmlns:p14="http://schemas.microsoft.com/office/powerpoint/2010/main" val="377546452"/>
+        <p14:creationId xmlns:p14="http://schemas.microsoft.com/office/powerpoint/2010/main" val="2559441040"/>
       </p:ext>
     </p:extLst>
   </p:cSld>
@@ -3276,6 +2823,94 @@
             <a:fld id="{5FA57C19-9E0E-4142-AAC1-12A23B691F36}" type="slidenum">
               <a:rPr lang="en-US" smtClean="0"/>
               <a:t>32</a:t>
+            </a:fld>
+            <a:endParaRPr lang="en-US"/>
+          </a:p>
+        </p:txBody>
+      </p:sp>
+    </p:spTree>
+    <p:extLst>
+      <p:ext uri="{BB962C8B-B14F-4D97-AF65-F5344CB8AC3E}">
+        <p14:creationId xmlns:p14="http://schemas.microsoft.com/office/powerpoint/2010/main" val="377546452"/>
+      </p:ext>
+    </p:extLst>
+  </p:cSld>
+  <p:clrMapOvr>
+    <a:masterClrMapping/>
+  </p:clrMapOvr>
+</p:notes>
+</file>
+
+<file path=ppt/notesSlides/notesSlide32.xml><?xml version="1.0" encoding="utf-8"?>
+<p:notes xmlns:a="http://schemas.openxmlformats.org/drawingml/2006/main" xmlns:r="http://schemas.openxmlformats.org/officeDocument/2006/relationships" xmlns:p="http://schemas.openxmlformats.org/presentationml/2006/main">
+  <p:cSld>
+    <p:spTree>
+      <p:nvGrpSpPr>
+        <p:cNvPr id="1" name=""/>
+        <p:cNvGrpSpPr/>
+        <p:nvPr/>
+      </p:nvGrpSpPr>
+      <p:grpSpPr>
+        <a:xfrm>
+          <a:off x="0" y="0"/>
+          <a:ext cx="0" cy="0"/>
+          <a:chOff x="0" y="0"/>
+          <a:chExt cx="0" cy="0"/>
+        </a:xfrm>
+      </p:grpSpPr>
+      <p:sp>
+        <p:nvSpPr>
+          <p:cNvPr id="2" name="Slide Image Placeholder 1"/>
+          <p:cNvSpPr>
+            <a:spLocks noGrp="1" noRot="1" noChangeAspect="1"/>
+          </p:cNvSpPr>
+          <p:nvPr>
+            <p:ph type="sldImg"/>
+          </p:nvPr>
+        </p:nvSpPr>
+        <p:spPr/>
+      </p:sp>
+      <p:sp>
+        <p:nvSpPr>
+          <p:cNvPr id="3" name="Notes Placeholder 2"/>
+          <p:cNvSpPr>
+            <a:spLocks noGrp="1"/>
+          </p:cNvSpPr>
+          <p:nvPr>
+            <p:ph type="body" idx="1"/>
+          </p:nvPr>
+        </p:nvSpPr>
+        <p:spPr/>
+        <p:txBody>
+          <a:bodyPr/>
+          <a:lstStyle/>
+          <a:p>
+            <a:pPr marL="171450" indent="-171450">
+              <a:buFont typeface="Arial" charset="0"/>
+              <a:buChar char="•"/>
+            </a:pPr>
+            <a:endParaRPr lang="en-US" baseline="0" dirty="0" smtClean="0"/>
+          </a:p>
+        </p:txBody>
+      </p:sp>
+      <p:sp>
+        <p:nvSpPr>
+          <p:cNvPr id="4" name="Slide Number Placeholder 3"/>
+          <p:cNvSpPr>
+            <a:spLocks noGrp="1"/>
+          </p:cNvSpPr>
+          <p:nvPr>
+            <p:ph type="sldNum" sz="quarter" idx="10"/>
+          </p:nvPr>
+        </p:nvSpPr>
+        <p:spPr/>
+        <p:txBody>
+          <a:bodyPr/>
+          <a:lstStyle/>
+          <a:p>
+            <a:fld id="{5FA57C19-9E0E-4142-AAC1-12A23B691F36}" type="slidenum">
+              <a:rPr lang="en-US" smtClean="0"/>
+              <a:t>33</a:t>
             </a:fld>
             <a:endParaRPr lang="en-US"/>
           </a:p>
@@ -3338,54 +2973,6 @@
           <a:bodyPr/>
           <a:lstStyle/>
           <a:p>
-            <a:pPr marL="171450" indent="-171450">
-              <a:buFont typeface="Arial" charset="0"/>
-              <a:buChar char="•"/>
-            </a:pPr>
-            <a:r>
-              <a:rPr lang="en-US" dirty="0" smtClean="0"/>
-              <a:t>To operate</a:t>
-            </a:r>
-            <a:r>
-              <a:rPr lang="en-US" baseline="0" dirty="0" smtClean="0"/>
-              <a:t> on lined lists, we need to know where their first and last nodes are. Thus, maintain special pointers to the head and tail</a:t>
-            </a:r>
-          </a:p>
-          <a:p>
-            <a:pPr marL="171450" indent="-171450">
-              <a:buFont typeface="Arial" charset="0"/>
-              <a:buChar char="•"/>
-            </a:pPr>
-            <a:endParaRPr lang="en-US" baseline="0" dirty="0" smtClean="0"/>
-          </a:p>
-          <a:p>
-            <a:pPr marL="171450" indent="-171450">
-              <a:buFont typeface="Arial" charset="0"/>
-              <a:buChar char="•"/>
-            </a:pPr>
-            <a:r>
-              <a:rPr lang="en-US" baseline="0" dirty="0" smtClean="0"/>
-              <a:t>In fact, as we shall see, the only thing a lined list needs to store is its head and tail pointers. It doesn’t store the nodes at all</a:t>
-            </a:r>
-          </a:p>
-          <a:p>
-            <a:pPr marL="171450" indent="-171450">
-              <a:buFont typeface="Arial" charset="0"/>
-              <a:buChar char="•"/>
-            </a:pPr>
-            <a:endParaRPr lang="en-US" baseline="0" dirty="0" smtClean="0"/>
-          </a:p>
-          <a:p>
-            <a:pPr marL="171450" indent="-171450">
-              <a:buFont typeface="Arial" charset="0"/>
-              <a:buChar char="•"/>
-            </a:pPr>
-            <a:r>
-              <a:rPr lang="en-US" baseline="0" dirty="0" smtClean="0"/>
-              <a:t>Given the head and tail, and on the assumption that all the nodes in the list are correctly hooked together, the list can be traversed, giving access to all the nodes, without explicitly store their locations</a:t>
-            </a:r>
-          </a:p>
-          <a:p>
             <a:pPr marL="0" indent="0">
               <a:buFont typeface="Arial" charset="0"/>
               <a:buNone/>
@@ -3474,88 +3061,6 @@
           <a:bodyPr/>
           <a:lstStyle/>
           <a:p>
-            <a:pPr marL="171450" indent="-171450">
-              <a:buFont typeface="Arial" charset="0"/>
-              <a:buChar char="•"/>
-            </a:pPr>
-            <a:r>
-              <a:rPr lang="en-US" dirty="0" smtClean="0"/>
-              <a:t>Any class can be</a:t>
-            </a:r>
-            <a:r>
-              <a:rPr lang="en-US" baseline="0" dirty="0" smtClean="0"/>
-              <a:t> a linked list node</a:t>
-            </a:r>
-          </a:p>
-          <a:p>
-            <a:pPr marL="171450" indent="-171450">
-              <a:buFont typeface="Arial" charset="0"/>
-              <a:buChar char="•"/>
-            </a:pPr>
-            <a:endParaRPr lang="en-US" baseline="0" dirty="0" smtClean="0"/>
-          </a:p>
-          <a:p>
-            <a:pPr marL="171450" indent="-171450">
-              <a:buFont typeface="Arial" charset="0"/>
-              <a:buChar char="•"/>
-            </a:pPr>
-            <a:r>
-              <a:rPr lang="en-US" baseline="0" dirty="0" smtClean="0"/>
-              <a:t>Nodes are simple objects</a:t>
-            </a:r>
-          </a:p>
-          <a:p>
-            <a:pPr marL="171450" indent="-171450">
-              <a:buFont typeface="Arial" charset="0"/>
-              <a:buChar char="•"/>
-            </a:pPr>
-            <a:endParaRPr lang="en-US" baseline="0" dirty="0" smtClean="0"/>
-          </a:p>
-          <a:p>
-            <a:pPr marL="171450" indent="-171450">
-              <a:buFont typeface="Arial" charset="0"/>
-              <a:buChar char="•"/>
-            </a:pPr>
-            <a:r>
-              <a:rPr lang="en-US" baseline="0" dirty="0" smtClean="0"/>
-              <a:t>Here is their generic structure…</a:t>
-            </a:r>
-          </a:p>
-          <a:p>
-            <a:pPr marL="171450" indent="-171450">
-              <a:buFont typeface="Arial" charset="0"/>
-              <a:buChar char="•"/>
-            </a:pPr>
-            <a:endParaRPr lang="en-US" baseline="0" dirty="0" smtClean="0"/>
-          </a:p>
-          <a:p>
-            <a:pPr marL="171450" indent="-171450">
-              <a:buFont typeface="Arial" charset="0"/>
-              <a:buChar char="•"/>
-            </a:pPr>
-            <a:r>
-              <a:rPr lang="en-US" baseline="0" dirty="0" smtClean="0"/>
-              <a:t>Note the Next pointer is a pointer to another item of the same type – the next node in the linked list</a:t>
-            </a:r>
-          </a:p>
-          <a:p>
-            <a:pPr marL="171450" indent="-171450">
-              <a:buFont typeface="Arial" charset="0"/>
-              <a:buChar char="•"/>
-            </a:pPr>
-            <a:endParaRPr lang="en-US" baseline="0" dirty="0" smtClean="0"/>
-          </a:p>
-          <a:p>
-            <a:pPr marL="171450" indent="-171450">
-              <a:buFont typeface="Arial" charset="0"/>
-              <a:buChar char="•"/>
-            </a:pPr>
-            <a:r>
-              <a:rPr lang="en-US" baseline="0" dirty="0" smtClean="0"/>
-              <a:t>Note that Next is capitalized for a reason</a:t>
-            </a:r>
-          </a:p>
-          <a:p>
             <a:pPr marL="0" indent="0">
               <a:buFont typeface="Arial" charset="0"/>
               <a:buNone/>
@@ -3648,48 +3153,6 @@
               <a:buFont typeface="Arial" charset="0"/>
               <a:buChar char="•"/>
             </a:pPr>
-            <a:r>
-              <a:rPr lang="en-US" dirty="0" smtClean="0"/>
-              <a:t>The linked</a:t>
-            </a:r>
-            <a:r>
-              <a:rPr lang="en-US" baseline="0" dirty="0" smtClean="0"/>
-              <a:t> list object doesn’t own any nodes directly</a:t>
-            </a:r>
-          </a:p>
-          <a:p>
-            <a:pPr marL="171450" indent="-171450">
-              <a:buFont typeface="Arial" charset="0"/>
-              <a:buChar char="•"/>
-            </a:pPr>
-            <a:endParaRPr lang="en-US" baseline="0" dirty="0" smtClean="0"/>
-          </a:p>
-          <a:p>
-            <a:pPr marL="171450" indent="-171450">
-              <a:buFont typeface="Arial" charset="0"/>
-              <a:buChar char="•"/>
-            </a:pPr>
-            <a:r>
-              <a:rPr lang="en-US" baseline="0" dirty="0" smtClean="0"/>
-              <a:t>It just keeps track of the head and tail nodes</a:t>
-            </a:r>
-          </a:p>
-          <a:p>
-            <a:pPr marL="171450" indent="-171450">
-              <a:buFont typeface="Arial" charset="0"/>
-              <a:buChar char="•"/>
-            </a:pPr>
-            <a:endParaRPr lang="en-US" baseline="0" dirty="0" smtClean="0"/>
-          </a:p>
-          <a:p>
-            <a:pPr marL="171450" indent="-171450">
-              <a:buFont typeface="Arial" charset="0"/>
-              <a:buChar char="•"/>
-            </a:pPr>
-            <a:r>
-              <a:rPr lang="en-US" baseline="0" dirty="0" smtClean="0"/>
-              <a:t>This is all it needs to insert, delete, traverse – i.e. perform all required list operations</a:t>
-            </a:r>
             <a:endParaRPr lang="en-US" dirty="0" smtClean="0"/>
           </a:p>
         </p:txBody>
@@ -3778,116 +3241,6 @@
               <a:buFont typeface="Arial" charset="0"/>
               <a:buChar char="•"/>
             </a:pPr>
-            <a:r>
-              <a:rPr lang="en-US" dirty="0" smtClean="0"/>
-              <a:t>Lists are</a:t>
-            </a:r>
-            <a:r>
-              <a:rPr lang="en-US" baseline="0" dirty="0" smtClean="0"/>
-              <a:t> empty when they start</a:t>
-            </a:r>
-          </a:p>
-          <a:p>
-            <a:pPr marL="171450" indent="-171450">
-              <a:buFont typeface="Arial" charset="0"/>
-              <a:buChar char="•"/>
-            </a:pPr>
-            <a:endParaRPr lang="en-US" baseline="0" dirty="0" smtClean="0"/>
-          </a:p>
-          <a:p>
-            <a:pPr marL="171450" indent="-171450">
-              <a:buFont typeface="Arial" charset="0"/>
-              <a:buChar char="•"/>
-            </a:pPr>
-            <a:r>
-              <a:rPr lang="en-US" baseline="0" dirty="0" smtClean="0"/>
-              <a:t>Be careful not to let pointers contain garbage – by garbage I mean memory addresses</a:t>
-            </a:r>
-          </a:p>
-          <a:p>
-            <a:pPr marL="171450" indent="-171450">
-              <a:buFont typeface="Arial" charset="0"/>
-              <a:buChar char="•"/>
-            </a:pPr>
-            <a:endParaRPr lang="en-US" baseline="0" dirty="0" smtClean="0"/>
-          </a:p>
-          <a:p>
-            <a:pPr marL="171450" indent="-171450">
-              <a:buFont typeface="Arial" charset="0"/>
-              <a:buChar char="•"/>
-            </a:pPr>
-            <a:r>
-              <a:rPr lang="en-US" baseline="0" dirty="0" smtClean="0"/>
-              <a:t>Always set “empty” pointers to the null value for the language and environment you are working in</a:t>
-            </a:r>
-          </a:p>
-          <a:p>
-            <a:pPr marL="171450" indent="-171450">
-              <a:buFont typeface="Arial" charset="0"/>
-              <a:buChar char="•"/>
-            </a:pPr>
-            <a:endParaRPr lang="en-US" baseline="0" dirty="0" smtClean="0"/>
-          </a:p>
-          <a:p>
-            <a:pPr marL="171450" indent="-171450">
-              <a:buFont typeface="Arial" charset="0"/>
-              <a:buChar char="•"/>
-            </a:pPr>
-            <a:r>
-              <a:rPr lang="en-US" baseline="0" dirty="0" smtClean="0"/>
-              <a:t>Note that way you express null is different language to language. In C#, it is null, but in Visual C++, it is nullptr</a:t>
-            </a:r>
-          </a:p>
-          <a:p>
-            <a:pPr marL="171450" indent="-171450">
-              <a:buFont typeface="Arial" charset="0"/>
-              <a:buChar char="•"/>
-            </a:pPr>
-            <a:endParaRPr lang="en-US" baseline="0" dirty="0" smtClean="0"/>
-          </a:p>
-          <a:p>
-            <a:pPr marL="171450" indent="-171450">
-              <a:buFont typeface="Arial" charset="0"/>
-              <a:buChar char="•"/>
-            </a:pPr>
-            <a:r>
-              <a:rPr lang="en-US" baseline="0" dirty="0" smtClean="0"/>
-              <a:t>You are going to be able to tell when linked lists are empty</a:t>
-            </a:r>
-          </a:p>
-          <a:p>
-            <a:pPr marL="171450" indent="-171450">
-              <a:buFont typeface="Arial" charset="0"/>
-              <a:buChar char="•"/>
-            </a:pPr>
-            <a:endParaRPr lang="en-US" baseline="0" dirty="0" smtClean="0"/>
-          </a:p>
-          <a:p>
-            <a:pPr marL="171450" indent="-171450">
-              <a:buFont typeface="Arial" charset="0"/>
-              <a:buChar char="•"/>
-            </a:pPr>
-            <a:r>
-              <a:rPr lang="en-US" baseline="0" dirty="0" smtClean="0"/>
-              <a:t>You have gotten to the end of the linked list by looking for these null pointers</a:t>
-            </a:r>
-          </a:p>
-          <a:p>
-            <a:pPr marL="171450" indent="-171450">
-              <a:buFont typeface="Arial" charset="0"/>
-              <a:buChar char="•"/>
-            </a:pPr>
-            <a:endParaRPr lang="en-US" baseline="0" dirty="0" smtClean="0"/>
-          </a:p>
-          <a:p>
-            <a:pPr marL="171450" indent="-171450">
-              <a:buFont typeface="Arial" charset="0"/>
-              <a:buChar char="•"/>
-            </a:pPr>
-            <a:r>
-              <a:rPr lang="en-US" baseline="0" dirty="0" smtClean="0"/>
-              <a:t>If you don’t initalise correctly to nullptr, the standard algorithm for linked list operations will not work</a:t>
-            </a:r>
             <a:endParaRPr lang="en-US" dirty="0" smtClean="0"/>
           </a:p>
         </p:txBody>
@@ -3972,9 +3325,9 @@
           <a:bodyPr/>
           <a:lstStyle/>
           <a:p>
-            <a:pPr marL="171450" indent="-171450">
+            <a:pPr marL="0" indent="0">
               <a:buFont typeface="Arial" charset="0"/>
-              <a:buChar char="•"/>
+              <a:buNone/>
             </a:pPr>
             <a:endParaRPr lang="en-US" dirty="0" smtClean="0"/>
           </a:p>
@@ -4068,7 +3421,6 @@
               <a:rPr lang="en-US" dirty="0" smtClean="0"/>
               <a:t>What type is it returning?</a:t>
             </a:r>
-            <a:endParaRPr lang="en-US" dirty="0" smtClean="0"/>
           </a:p>
         </p:txBody>
       </p:sp>
@@ -8936,6 +8288,58 @@
           </a:p>
         </p:txBody>
       </p:sp>
+      <p:pic>
+        <p:nvPicPr>
+          <p:cNvPr id="3" name="Picture 2"/>
+          <p:cNvPicPr>
+            <a:picLocks noChangeAspect="1" noChangeArrowheads="1"/>
+          </p:cNvPicPr>
+          <p:nvPr/>
+        </p:nvPicPr>
+        <p:blipFill rotWithShape="1">
+          <a:blip r:embed="rId3" cstate="print">
+            <a:extLst>
+              <a:ext uri="{28A0092B-C50C-407E-A947-70E740481C1C}">
+                <a14:useLocalDpi xmlns:a14="http://schemas.microsoft.com/office/drawing/2010/main" val="0"/>
+              </a:ext>
+            </a:extLst>
+          </a:blip>
+          <a:srcRect t="14445" b="8216"/>
+          <a:stretch/>
+        </p:blipFill>
+        <p:spPr bwMode="auto">
+          <a:xfrm>
+            <a:off x="872006" y="2133600"/>
+            <a:ext cx="7412180" cy="3200400"/>
+          </a:xfrm>
+          <a:prstGeom prst="rect">
+            <a:avLst/>
+          </a:prstGeom>
+          <a:noFill/>
+          <a:ln>
+            <a:noFill/>
+          </a:ln>
+          <a:extLst>
+            <a:ext uri="{909E8E84-426E-40DD-AFC4-6F175D3DCCD1}">
+              <a14:hiddenFill xmlns:a14="http://schemas.microsoft.com/office/drawing/2010/main">
+                <a:solidFill>
+                  <a:schemeClr val="accent1"/>
+                </a:solidFill>
+              </a14:hiddenFill>
+            </a:ext>
+            <a:ext uri="{91240B29-F687-4F45-9708-019B960494DF}">
+              <a14:hiddenLine xmlns:a14="http://schemas.microsoft.com/office/drawing/2010/main" w="9525">
+                <a:solidFill>
+                  <a:schemeClr val="tx1"/>
+                </a:solidFill>
+                <a:miter lim="800000"/>
+                <a:headEnd/>
+                <a:tailEnd/>
+              </a14:hiddenLine>
+            </a:ext>
+          </a:extLst>
+        </p:spPr>
+      </p:pic>
     </p:spTree>
     <p:extLst>
       <p:ext uri="{BB962C8B-B14F-4D97-AF65-F5344CB8AC3E}">
@@ -11508,7 +10912,6 @@
               <a:rPr lang="en-US" sz="3500" b="1" dirty="0" smtClean="0"/>
               <a:t>Deleting</a:t>
             </a:r>
-            <a:endParaRPr lang="en-US" sz="3500" b="1" dirty="0" smtClean="0"/>
           </a:p>
           <a:p>
             <a:pPr lvl="1"/>
@@ -11652,7 +11055,7 @@
         <p:spPr>
           <a:xfrm>
             <a:off x="6096" y="6096"/>
-            <a:ext cx="9144000" cy="2377574"/>
+            <a:ext cx="9144000" cy="1992853"/>
           </a:xfrm>
           <a:prstGeom prst="rect">
             <a:avLst/>
@@ -11686,31 +11089,13 @@
             </a:pPr>
             <a:r>
               <a:rPr lang="en-US" sz="2500" dirty="0" smtClean="0"/>
-              <a:t>Deleting monster3</a:t>
-            </a:r>
-          </a:p>
-          <a:p>
-            <a:pPr marL="1657350" lvl="2" indent="-742950">
-              <a:buFont typeface="Arial" panose="020B0604020202020204" pitchFamily="34" charset="0"/>
-              <a:buChar char="•"/>
-            </a:pPr>
+              <a:t>Deleting </a:t>
+            </a:r>
             <a:r>
               <a:rPr lang="en-US" sz="2500" dirty="0" smtClean="0"/>
-              <a:t>nodeWalker </a:t>
-            </a:r>
-            <a:r>
-              <a:rPr lang="en-US" sz="2500" dirty="0"/>
-              <a:t>= </a:t>
-            </a:r>
-            <a:r>
-              <a:rPr lang="en-US" sz="2500" dirty="0" smtClean="0"/>
-              <a:t>nodeWalker-&gt;</a:t>
-            </a:r>
-            <a:r>
-              <a:rPr lang="en-US" sz="2500" dirty="0" smtClean="0"/>
-              <a:t>Next</a:t>
-            </a:r>
-            <a:endParaRPr lang="en-US" sz="2000" dirty="0"/>
+              <a:t>monster3</a:t>
+            </a:r>
+            <a:endParaRPr lang="en-US" sz="2500" dirty="0" smtClean="0"/>
           </a:p>
         </p:txBody>
       </p:sp>
@@ -12609,11 +11994,7 @@
             </a:r>
             <a:r>
               <a:rPr lang="en-US" sz="2500" dirty="0" smtClean="0"/>
-              <a:t>nodeWalker-&gt;</a:t>
-            </a:r>
-            <a:r>
-              <a:rPr lang="en-US" sz="2500" dirty="0" smtClean="0"/>
-              <a:t>Next</a:t>
+              <a:t>nodeWalker-&gt;Next</a:t>
             </a:r>
             <a:endParaRPr lang="en-US" sz="2000" dirty="0"/>
           </a:p>
@@ -13389,9 +12770,9 @@
           <p:nvPr/>
         </p:nvSpPr>
         <p:spPr bwMode="auto">
-          <a:xfrm>
-            <a:off x="3641129" y="2987181"/>
-            <a:ext cx="1" cy="1029423"/>
+          <a:xfrm flipH="1">
+            <a:off x="2209799" y="2987181"/>
+            <a:ext cx="1431331" cy="1029421"/>
           </a:xfrm>
           <a:prstGeom prst="line">
             <a:avLst/>
@@ -13418,7 +12799,7 @@
     </p:spTree>
     <p:extLst>
       <p:ext uri="{BB962C8B-B14F-4D97-AF65-F5344CB8AC3E}">
-        <p14:creationId xmlns:p14="http://schemas.microsoft.com/office/powerpoint/2010/main" val="4183199795"/>
+        <p14:creationId xmlns:p14="http://schemas.microsoft.com/office/powerpoint/2010/main" val="955419014"/>
       </p:ext>
     </p:extLst>
   </p:cSld>
@@ -13496,20 +12877,25 @@
             </a:r>
           </a:p>
           <a:p>
+            <a:pPr lvl="1"/>
+            <a:endParaRPr lang="en-US" sz="2500" dirty="0" smtClean="0"/>
+          </a:p>
+          <a:p>
             <a:pPr marL="1657350" lvl="2" indent="-742950">
               <a:buFont typeface="Arial" panose="020B0604020202020204" pitchFamily="34" charset="0"/>
               <a:buChar char="•"/>
             </a:pPr>
-            <a:endParaRPr lang="en-US" sz="2500" dirty="0" smtClean="0"/>
-          </a:p>
-          <a:p>
-            <a:pPr marL="1657350" lvl="2" indent="-742950">
-              <a:buFont typeface="Arial" panose="020B0604020202020204" pitchFamily="34" charset="0"/>
-              <a:buChar char="•"/>
-            </a:pPr>
             <a:r>
               <a:rPr lang="en-US" sz="2500" dirty="0" smtClean="0"/>
-              <a:t>nodeWalker-&gt;Next now equals nodeToDelete </a:t>
+              <a:t>nodeWalker </a:t>
+            </a:r>
+            <a:r>
+              <a:rPr lang="en-US" sz="2500" dirty="0"/>
+              <a:t>= </a:t>
+            </a:r>
+            <a:r>
+              <a:rPr lang="en-US" sz="2500" dirty="0" smtClean="0"/>
+              <a:t>nodeWalker-&gt;Next</a:t>
             </a:r>
             <a:endParaRPr lang="en-US" sz="2000" dirty="0"/>
           </a:p>
@@ -14286,6 +13672,902 @@
         </p:nvSpPr>
         <p:spPr bwMode="auto">
           <a:xfrm>
+            <a:off x="3641129" y="2987181"/>
+            <a:ext cx="1" cy="1029423"/>
+          </a:xfrm>
+          <a:prstGeom prst="line">
+            <a:avLst/>
+          </a:prstGeom>
+          <a:noFill/>
+          <a:ln w="9525">
+            <a:solidFill>
+              <a:schemeClr val="tx1"/>
+            </a:solidFill>
+            <a:round/>
+            <a:headEnd/>
+            <a:tailEnd type="triangle" w="med" len="med"/>
+          </a:ln>
+          <a:effectLst/>
+        </p:spPr>
+        <p:txBody>
+          <a:bodyPr/>
+          <a:lstStyle/>
+          <a:p>
+            <a:endParaRPr lang="en-NZ"/>
+          </a:p>
+        </p:txBody>
+      </p:sp>
+    </p:spTree>
+    <p:extLst>
+      <p:ext uri="{BB962C8B-B14F-4D97-AF65-F5344CB8AC3E}">
+        <p14:creationId xmlns:p14="http://schemas.microsoft.com/office/powerpoint/2010/main" val="4183199795"/>
+      </p:ext>
+    </p:extLst>
+  </p:cSld>
+  <p:clrMapOvr>
+    <a:masterClrMapping/>
+  </p:clrMapOvr>
+  <p:timing>
+    <p:tnLst>
+      <p:par>
+        <p:cTn id="1" dur="indefinite" restart="never" nodeType="tmRoot"/>
+      </p:par>
+    </p:tnLst>
+  </p:timing>
+</p:sld>
+</file>
+
+<file path=ppt/slides/slide26.xml><?xml version="1.0" encoding="utf-8"?>
+<p:sld xmlns:a="http://schemas.openxmlformats.org/drawingml/2006/main" xmlns:r="http://schemas.openxmlformats.org/officeDocument/2006/relationships" xmlns:p="http://schemas.openxmlformats.org/presentationml/2006/main">
+  <p:cSld>
+    <p:bg>
+      <p:bgPr>
+        <a:solidFill>
+          <a:schemeClr val="accent5">
+            <a:lumMod val="60000"/>
+            <a:lumOff val="40000"/>
+          </a:schemeClr>
+        </a:solidFill>
+        <a:effectLst/>
+      </p:bgPr>
+    </p:bg>
+    <p:spTree>
+      <p:nvGrpSpPr>
+        <p:cNvPr id="1" name=""/>
+        <p:cNvGrpSpPr/>
+        <p:nvPr/>
+      </p:nvGrpSpPr>
+      <p:grpSpPr>
+        <a:xfrm>
+          <a:off x="0" y="0"/>
+          <a:ext cx="0" cy="0"/>
+          <a:chOff x="0" y="0"/>
+          <a:chExt cx="0" cy="0"/>
+        </a:xfrm>
+      </p:grpSpPr>
+      <p:sp>
+        <p:nvSpPr>
+          <p:cNvPr id="5" name="Rectangle 4"/>
+          <p:cNvSpPr/>
+          <p:nvPr/>
+        </p:nvSpPr>
+        <p:spPr>
+          <a:xfrm>
+            <a:off x="6096" y="6096"/>
+            <a:ext cx="9144000" cy="1992853"/>
+          </a:xfrm>
+          <a:prstGeom prst="rect">
+            <a:avLst/>
+          </a:prstGeom>
+          <a:noFill/>
+        </p:spPr>
+        <p:txBody>
+          <a:bodyPr wrap="square" lIns="68580" tIns="34290" rIns="68580" bIns="34290">
+            <a:spAutoFit/>
+          </a:bodyPr>
+          <a:lstStyle/>
+          <a:p>
+            <a:pPr algn="ctr"/>
+            <a:endParaRPr lang="en-US" sz="4000" b="1" dirty="0" smtClean="0"/>
+          </a:p>
+          <a:p>
+            <a:pPr lvl="1"/>
+            <a:r>
+              <a:rPr lang="en-US" sz="3500" b="1" dirty="0" smtClean="0"/>
+              <a:t>Deleting continued</a:t>
+            </a:r>
+          </a:p>
+          <a:p>
+            <a:pPr marL="1657350" lvl="2" indent="-742950">
+              <a:buFont typeface="Arial" panose="020B0604020202020204" pitchFamily="34" charset="0"/>
+              <a:buChar char="•"/>
+            </a:pPr>
+            <a:endParaRPr lang="en-US" sz="2500" dirty="0" smtClean="0"/>
+          </a:p>
+          <a:p>
+            <a:pPr marL="1657350" lvl="2" indent="-742950">
+              <a:buFont typeface="Arial" panose="020B0604020202020204" pitchFamily="34" charset="0"/>
+              <a:buChar char="•"/>
+            </a:pPr>
+            <a:r>
+              <a:rPr lang="en-US" sz="2500" dirty="0" smtClean="0"/>
+              <a:t>nodeWalker-&gt;Next now equals nodeToDelete </a:t>
+            </a:r>
+            <a:endParaRPr lang="en-US" sz="2000" dirty="0"/>
+          </a:p>
+        </p:txBody>
+      </p:sp>
+      <p:grpSp>
+        <p:nvGrpSpPr>
+          <p:cNvPr id="2" name="Group 1"/>
+          <p:cNvGrpSpPr/>
+          <p:nvPr/>
+        </p:nvGrpSpPr>
+        <p:grpSpPr>
+          <a:xfrm>
+            <a:off x="1183857" y="2665030"/>
+            <a:ext cx="6847845" cy="3082250"/>
+            <a:chOff x="252413" y="3009550"/>
+            <a:chExt cx="8423275" cy="3545050"/>
+          </a:xfrm>
+        </p:grpSpPr>
+        <p:sp>
+          <p:nvSpPr>
+            <p:cNvPr id="3" name="Text Box 4"/>
+            <p:cNvSpPr txBox="1">
+              <a:spLocks noChangeArrowheads="1"/>
+            </p:cNvSpPr>
+            <p:nvPr/>
+          </p:nvSpPr>
+          <p:spPr bwMode="auto">
+            <a:xfrm>
+              <a:off x="360362" y="3009550"/>
+              <a:ext cx="1511300" cy="460187"/>
+            </a:xfrm>
+            <a:prstGeom prst="rect">
+              <a:avLst/>
+            </a:prstGeom>
+            <a:noFill/>
+            <a:ln w="9525">
+              <a:solidFill>
+                <a:schemeClr val="tx1"/>
+              </a:solidFill>
+              <a:miter lim="800000"/>
+              <a:headEnd/>
+              <a:tailEnd/>
+            </a:ln>
+            <a:effectLst/>
+          </p:spPr>
+          <p:txBody>
+            <a:bodyPr>
+              <a:spAutoFit/>
+            </a:bodyPr>
+            <a:lstStyle/>
+            <a:p>
+              <a:pPr algn="ctr">
+                <a:spcBef>
+                  <a:spcPct val="50000"/>
+                </a:spcBef>
+              </a:pPr>
+              <a:r>
+                <a:rPr lang="en-NZ" sz="2000" b="1" dirty="0" smtClean="0"/>
+                <a:t>head</a:t>
+              </a:r>
+              <a:endParaRPr lang="en-NZ" sz="2000" b="1" dirty="0"/>
+            </a:p>
+          </p:txBody>
+        </p:sp>
+        <p:sp>
+          <p:nvSpPr>
+            <p:cNvPr id="4" name="Text Box 6"/>
+            <p:cNvSpPr txBox="1">
+              <a:spLocks noChangeArrowheads="1"/>
+            </p:cNvSpPr>
+            <p:nvPr/>
+          </p:nvSpPr>
+          <p:spPr bwMode="auto">
+            <a:xfrm>
+              <a:off x="252413" y="4564063"/>
+              <a:ext cx="1727200" cy="460187"/>
+            </a:xfrm>
+            <a:prstGeom prst="rect">
+              <a:avLst/>
+            </a:prstGeom>
+            <a:noFill/>
+            <a:ln w="9525">
+              <a:solidFill>
+                <a:schemeClr val="tx1"/>
+              </a:solidFill>
+              <a:miter lim="800000"/>
+              <a:headEnd/>
+              <a:tailEnd/>
+            </a:ln>
+            <a:effectLst/>
+          </p:spPr>
+          <p:txBody>
+            <a:bodyPr>
+              <a:spAutoFit/>
+            </a:bodyPr>
+            <a:lstStyle/>
+            <a:p>
+              <a:pPr algn="ctr">
+                <a:spcBef>
+                  <a:spcPct val="50000"/>
+                </a:spcBef>
+              </a:pPr>
+              <a:r>
+                <a:rPr lang="en-NZ" sz="2000" b="1" dirty="0" smtClean="0"/>
+                <a:t>monster1</a:t>
+              </a:r>
+              <a:endParaRPr lang="en-NZ" sz="2000" b="1" dirty="0"/>
+            </a:p>
+          </p:txBody>
+        </p:sp>
+        <p:sp>
+          <p:nvSpPr>
+            <p:cNvPr id="6" name="Text Box 7"/>
+            <p:cNvSpPr txBox="1">
+              <a:spLocks noChangeArrowheads="1"/>
+            </p:cNvSpPr>
+            <p:nvPr/>
+          </p:nvSpPr>
+          <p:spPr bwMode="auto">
+            <a:xfrm>
+              <a:off x="252413" y="5027569"/>
+              <a:ext cx="1727200" cy="376238"/>
+            </a:xfrm>
+            <a:prstGeom prst="rect">
+              <a:avLst/>
+            </a:prstGeom>
+            <a:noFill/>
+            <a:ln w="9525">
+              <a:solidFill>
+                <a:schemeClr val="tx1"/>
+              </a:solidFill>
+              <a:miter lim="800000"/>
+              <a:headEnd/>
+              <a:tailEnd/>
+            </a:ln>
+            <a:effectLst/>
+          </p:spPr>
+          <p:txBody>
+            <a:bodyPr>
+              <a:spAutoFit/>
+            </a:bodyPr>
+            <a:lstStyle/>
+            <a:p>
+              <a:pPr algn="ctr">
+                <a:spcBef>
+                  <a:spcPct val="50000"/>
+                </a:spcBef>
+              </a:pPr>
+              <a:endParaRPr lang="en-US"/>
+            </a:p>
+          </p:txBody>
+        </p:sp>
+        <p:sp>
+          <p:nvSpPr>
+            <p:cNvPr id="7" name="Line 8"/>
+            <p:cNvSpPr>
+              <a:spLocks noChangeShapeType="1"/>
+            </p:cNvSpPr>
+            <p:nvPr/>
+          </p:nvSpPr>
+          <p:spPr bwMode="auto">
+            <a:xfrm>
+              <a:off x="971550" y="5213350"/>
+              <a:ext cx="1584325" cy="0"/>
+            </a:xfrm>
+            <a:prstGeom prst="line">
+              <a:avLst/>
+            </a:prstGeom>
+            <a:noFill/>
+            <a:ln w="9525">
+              <a:solidFill>
+                <a:schemeClr val="tx1"/>
+              </a:solidFill>
+              <a:round/>
+              <a:headEnd/>
+              <a:tailEnd type="triangle" w="med" len="med"/>
+            </a:ln>
+            <a:effectLst/>
+          </p:spPr>
+          <p:txBody>
+            <a:bodyPr/>
+            <a:lstStyle/>
+            <a:p>
+              <a:endParaRPr lang="en-NZ"/>
+            </a:p>
+          </p:txBody>
+        </p:sp>
+        <p:sp>
+          <p:nvSpPr>
+            <p:cNvPr id="8" name="Text Box 9"/>
+            <p:cNvSpPr txBox="1">
+              <a:spLocks noChangeArrowheads="1"/>
+            </p:cNvSpPr>
+            <p:nvPr/>
+          </p:nvSpPr>
+          <p:spPr bwMode="auto">
+            <a:xfrm>
+              <a:off x="2555875" y="4564063"/>
+              <a:ext cx="1657350" cy="460187"/>
+            </a:xfrm>
+            <a:prstGeom prst="rect">
+              <a:avLst/>
+            </a:prstGeom>
+            <a:noFill/>
+            <a:ln w="9525">
+              <a:solidFill>
+                <a:schemeClr val="tx1"/>
+              </a:solidFill>
+              <a:miter lim="800000"/>
+              <a:headEnd/>
+              <a:tailEnd/>
+            </a:ln>
+            <a:effectLst/>
+          </p:spPr>
+          <p:txBody>
+            <a:bodyPr>
+              <a:spAutoFit/>
+            </a:bodyPr>
+            <a:lstStyle/>
+            <a:p>
+              <a:pPr algn="ctr">
+                <a:spcBef>
+                  <a:spcPct val="50000"/>
+                </a:spcBef>
+              </a:pPr>
+              <a:r>
+                <a:rPr lang="en-NZ" sz="2000" b="1" dirty="0" smtClean="0"/>
+                <a:t>monster2</a:t>
+              </a:r>
+              <a:endParaRPr lang="en-NZ" sz="2000" b="1" dirty="0"/>
+            </a:p>
+          </p:txBody>
+        </p:sp>
+        <p:sp>
+          <p:nvSpPr>
+            <p:cNvPr id="9" name="Text Box 10"/>
+            <p:cNvSpPr txBox="1">
+              <a:spLocks noChangeArrowheads="1"/>
+            </p:cNvSpPr>
+            <p:nvPr/>
+          </p:nvSpPr>
+          <p:spPr bwMode="auto">
+            <a:xfrm>
+              <a:off x="2555875" y="5027569"/>
+              <a:ext cx="1657350" cy="376238"/>
+            </a:xfrm>
+            <a:prstGeom prst="rect">
+              <a:avLst/>
+            </a:prstGeom>
+            <a:noFill/>
+            <a:ln w="9525">
+              <a:solidFill>
+                <a:schemeClr val="tx1"/>
+              </a:solidFill>
+              <a:miter lim="800000"/>
+              <a:headEnd/>
+              <a:tailEnd/>
+            </a:ln>
+            <a:effectLst/>
+          </p:spPr>
+          <p:txBody>
+            <a:bodyPr>
+              <a:spAutoFit/>
+            </a:bodyPr>
+            <a:lstStyle/>
+            <a:p>
+              <a:pPr algn="ctr">
+                <a:spcBef>
+                  <a:spcPct val="50000"/>
+                </a:spcBef>
+              </a:pPr>
+              <a:endParaRPr lang="en-US"/>
+            </a:p>
+          </p:txBody>
+        </p:sp>
+        <p:sp>
+          <p:nvSpPr>
+            <p:cNvPr id="10" name="Line 11"/>
+            <p:cNvSpPr>
+              <a:spLocks noChangeShapeType="1"/>
+            </p:cNvSpPr>
+            <p:nvPr/>
+          </p:nvSpPr>
+          <p:spPr bwMode="auto">
+            <a:xfrm>
+              <a:off x="3275013" y="5213350"/>
+              <a:ext cx="1584325" cy="0"/>
+            </a:xfrm>
+            <a:prstGeom prst="line">
+              <a:avLst/>
+            </a:prstGeom>
+            <a:noFill/>
+            <a:ln w="9525">
+              <a:solidFill>
+                <a:schemeClr val="tx1"/>
+              </a:solidFill>
+              <a:round/>
+              <a:headEnd/>
+              <a:tailEnd type="triangle" w="med" len="med"/>
+            </a:ln>
+            <a:effectLst/>
+          </p:spPr>
+          <p:txBody>
+            <a:bodyPr/>
+            <a:lstStyle/>
+            <a:p>
+              <a:endParaRPr lang="en-NZ"/>
+            </a:p>
+          </p:txBody>
+        </p:sp>
+        <p:sp>
+          <p:nvSpPr>
+            <p:cNvPr id="11" name="Text Box 12"/>
+            <p:cNvSpPr txBox="1">
+              <a:spLocks noChangeArrowheads="1"/>
+            </p:cNvSpPr>
+            <p:nvPr/>
+          </p:nvSpPr>
+          <p:spPr bwMode="auto">
+            <a:xfrm>
+              <a:off x="4860925" y="4564063"/>
+              <a:ext cx="1727200" cy="460187"/>
+            </a:xfrm>
+            <a:prstGeom prst="rect">
+              <a:avLst/>
+            </a:prstGeom>
+            <a:noFill/>
+            <a:ln w="9525">
+              <a:solidFill>
+                <a:schemeClr val="tx1"/>
+              </a:solidFill>
+              <a:miter lim="800000"/>
+              <a:headEnd/>
+              <a:tailEnd/>
+            </a:ln>
+            <a:effectLst/>
+          </p:spPr>
+          <p:txBody>
+            <a:bodyPr>
+              <a:spAutoFit/>
+            </a:bodyPr>
+            <a:lstStyle/>
+            <a:p>
+              <a:pPr algn="ctr">
+                <a:spcBef>
+                  <a:spcPct val="50000"/>
+                </a:spcBef>
+              </a:pPr>
+              <a:r>
+                <a:rPr lang="en-NZ" sz="2000" b="1" dirty="0" smtClean="0"/>
+                <a:t>monster3</a:t>
+              </a:r>
+              <a:endParaRPr lang="en-NZ" sz="2000" b="1" dirty="0"/>
+            </a:p>
+          </p:txBody>
+        </p:sp>
+        <p:sp>
+          <p:nvSpPr>
+            <p:cNvPr id="12" name="Text Box 13"/>
+            <p:cNvSpPr txBox="1">
+              <a:spLocks noChangeArrowheads="1"/>
+            </p:cNvSpPr>
+            <p:nvPr/>
+          </p:nvSpPr>
+          <p:spPr bwMode="auto">
+            <a:xfrm>
+              <a:off x="4860922" y="5027569"/>
+              <a:ext cx="1727200" cy="376238"/>
+            </a:xfrm>
+            <a:prstGeom prst="rect">
+              <a:avLst/>
+            </a:prstGeom>
+            <a:noFill/>
+            <a:ln w="9525">
+              <a:solidFill>
+                <a:schemeClr val="tx1"/>
+              </a:solidFill>
+              <a:miter lim="800000"/>
+              <a:headEnd/>
+              <a:tailEnd/>
+            </a:ln>
+            <a:effectLst/>
+          </p:spPr>
+          <p:txBody>
+            <a:bodyPr>
+              <a:spAutoFit/>
+            </a:bodyPr>
+            <a:lstStyle/>
+            <a:p>
+              <a:pPr algn="ctr">
+                <a:spcBef>
+                  <a:spcPct val="50000"/>
+                </a:spcBef>
+              </a:pPr>
+              <a:endParaRPr lang="en-US"/>
+            </a:p>
+          </p:txBody>
+        </p:sp>
+        <p:sp>
+          <p:nvSpPr>
+            <p:cNvPr id="13" name="Line 14"/>
+            <p:cNvSpPr>
+              <a:spLocks noChangeShapeType="1"/>
+            </p:cNvSpPr>
+            <p:nvPr/>
+          </p:nvSpPr>
+          <p:spPr bwMode="auto">
+            <a:xfrm>
+              <a:off x="1114426" y="3502025"/>
+              <a:ext cx="1587" cy="1079500"/>
+            </a:xfrm>
+            <a:prstGeom prst="line">
+              <a:avLst/>
+            </a:prstGeom>
+            <a:noFill/>
+            <a:ln w="9525">
+              <a:solidFill>
+                <a:schemeClr val="tx1"/>
+              </a:solidFill>
+              <a:round/>
+              <a:headEnd/>
+              <a:tailEnd type="triangle" w="med" len="med"/>
+            </a:ln>
+            <a:effectLst/>
+          </p:spPr>
+          <p:txBody>
+            <a:bodyPr/>
+            <a:lstStyle/>
+            <a:p>
+              <a:endParaRPr lang="en-NZ"/>
+            </a:p>
+          </p:txBody>
+        </p:sp>
+        <p:sp>
+          <p:nvSpPr>
+            <p:cNvPr id="14" name="Text Box 15"/>
+            <p:cNvSpPr txBox="1">
+              <a:spLocks noChangeArrowheads="1"/>
+            </p:cNvSpPr>
+            <p:nvPr/>
+          </p:nvSpPr>
+          <p:spPr bwMode="auto">
+            <a:xfrm>
+              <a:off x="7091362" y="3052288"/>
+              <a:ext cx="1511300" cy="460187"/>
+            </a:xfrm>
+            <a:prstGeom prst="rect">
+              <a:avLst/>
+            </a:prstGeom>
+            <a:noFill/>
+            <a:ln w="9525">
+              <a:solidFill>
+                <a:schemeClr val="tx1"/>
+              </a:solidFill>
+              <a:miter lim="800000"/>
+              <a:headEnd/>
+              <a:tailEnd/>
+            </a:ln>
+            <a:effectLst/>
+          </p:spPr>
+          <p:txBody>
+            <a:bodyPr>
+              <a:spAutoFit/>
+            </a:bodyPr>
+            <a:lstStyle/>
+            <a:p>
+              <a:pPr algn="ctr">
+                <a:spcBef>
+                  <a:spcPct val="50000"/>
+                </a:spcBef>
+              </a:pPr>
+              <a:r>
+                <a:rPr lang="en-NZ" sz="2000" b="1" dirty="0" smtClean="0"/>
+                <a:t>tail</a:t>
+              </a:r>
+              <a:endParaRPr lang="en-NZ" sz="2000" b="1" dirty="0"/>
+            </a:p>
+          </p:txBody>
+        </p:sp>
+        <p:sp>
+          <p:nvSpPr>
+            <p:cNvPr id="15" name="Line 17"/>
+            <p:cNvSpPr>
+              <a:spLocks noChangeShapeType="1"/>
+            </p:cNvSpPr>
+            <p:nvPr/>
+          </p:nvSpPr>
+          <p:spPr bwMode="auto">
+            <a:xfrm>
+              <a:off x="7847012" y="3516048"/>
+              <a:ext cx="1588" cy="1079500"/>
+            </a:xfrm>
+            <a:prstGeom prst="line">
+              <a:avLst/>
+            </a:prstGeom>
+            <a:noFill/>
+            <a:ln w="9525">
+              <a:solidFill>
+                <a:schemeClr val="tx1"/>
+              </a:solidFill>
+              <a:round/>
+              <a:headEnd/>
+              <a:tailEnd type="triangle" w="med" len="med"/>
+            </a:ln>
+            <a:effectLst/>
+          </p:spPr>
+          <p:txBody>
+            <a:bodyPr/>
+            <a:lstStyle/>
+            <a:p>
+              <a:endParaRPr lang="en-NZ"/>
+            </a:p>
+          </p:txBody>
+        </p:sp>
+        <p:sp>
+          <p:nvSpPr>
+            <p:cNvPr id="16" name="Text Box 18"/>
+            <p:cNvSpPr txBox="1">
+              <a:spLocks noChangeArrowheads="1"/>
+            </p:cNvSpPr>
+            <p:nvPr/>
+          </p:nvSpPr>
+          <p:spPr bwMode="auto">
+            <a:xfrm>
+              <a:off x="7018338" y="4581525"/>
+              <a:ext cx="1657350" cy="460187"/>
+            </a:xfrm>
+            <a:prstGeom prst="rect">
+              <a:avLst/>
+            </a:prstGeom>
+            <a:noFill/>
+            <a:ln w="9525">
+              <a:solidFill>
+                <a:schemeClr val="tx1"/>
+              </a:solidFill>
+              <a:miter lim="800000"/>
+              <a:headEnd/>
+              <a:tailEnd/>
+            </a:ln>
+            <a:effectLst/>
+          </p:spPr>
+          <p:txBody>
+            <a:bodyPr>
+              <a:spAutoFit/>
+            </a:bodyPr>
+            <a:lstStyle/>
+            <a:p>
+              <a:pPr algn="ctr">
+                <a:spcBef>
+                  <a:spcPct val="50000"/>
+                </a:spcBef>
+              </a:pPr>
+              <a:r>
+                <a:rPr lang="en-NZ" sz="2000" b="1" dirty="0" smtClean="0"/>
+                <a:t>monster4</a:t>
+              </a:r>
+              <a:endParaRPr lang="en-NZ" sz="2000" b="1" dirty="0"/>
+            </a:p>
+          </p:txBody>
+        </p:sp>
+        <p:sp>
+          <p:nvSpPr>
+            <p:cNvPr id="17" name="Text Box 19"/>
+            <p:cNvSpPr txBox="1">
+              <a:spLocks noChangeArrowheads="1"/>
+            </p:cNvSpPr>
+            <p:nvPr/>
+          </p:nvSpPr>
+          <p:spPr bwMode="auto">
+            <a:xfrm>
+              <a:off x="7018338" y="5027569"/>
+              <a:ext cx="1657350" cy="376237"/>
+            </a:xfrm>
+            <a:prstGeom prst="rect">
+              <a:avLst/>
+            </a:prstGeom>
+            <a:noFill/>
+            <a:ln w="9525">
+              <a:solidFill>
+                <a:schemeClr val="tx1"/>
+              </a:solidFill>
+              <a:miter lim="800000"/>
+              <a:headEnd/>
+              <a:tailEnd/>
+            </a:ln>
+            <a:effectLst/>
+          </p:spPr>
+          <p:txBody>
+            <a:bodyPr>
+              <a:spAutoFit/>
+            </a:bodyPr>
+            <a:lstStyle/>
+            <a:p>
+              <a:pPr algn="ctr">
+                <a:spcBef>
+                  <a:spcPct val="50000"/>
+                </a:spcBef>
+              </a:pPr>
+              <a:endParaRPr lang="en-US"/>
+            </a:p>
+          </p:txBody>
+        </p:sp>
+        <p:sp>
+          <p:nvSpPr>
+            <p:cNvPr id="18" name="Line 20"/>
+            <p:cNvSpPr>
+              <a:spLocks noChangeShapeType="1"/>
+            </p:cNvSpPr>
+            <p:nvPr/>
+          </p:nvSpPr>
+          <p:spPr bwMode="auto">
+            <a:xfrm>
+              <a:off x="5940425" y="5157788"/>
+              <a:ext cx="1584325" cy="0"/>
+            </a:xfrm>
+            <a:prstGeom prst="line">
+              <a:avLst/>
+            </a:prstGeom>
+            <a:noFill/>
+            <a:ln w="9525">
+              <a:solidFill>
+                <a:schemeClr val="tx1"/>
+              </a:solidFill>
+              <a:round/>
+              <a:headEnd/>
+              <a:tailEnd type="triangle" w="med" len="med"/>
+            </a:ln>
+            <a:effectLst/>
+          </p:spPr>
+          <p:txBody>
+            <a:bodyPr/>
+            <a:lstStyle/>
+            <a:p>
+              <a:endParaRPr lang="en-NZ"/>
+            </a:p>
+          </p:txBody>
+        </p:sp>
+        <p:sp>
+          <p:nvSpPr>
+            <p:cNvPr id="19" name="Text Box 21"/>
+            <p:cNvSpPr txBox="1">
+              <a:spLocks noChangeArrowheads="1"/>
+            </p:cNvSpPr>
+            <p:nvPr/>
+          </p:nvSpPr>
+          <p:spPr bwMode="auto">
+            <a:xfrm>
+              <a:off x="4537074" y="6094413"/>
+              <a:ext cx="2374899" cy="460187"/>
+            </a:xfrm>
+            <a:prstGeom prst="rect">
+              <a:avLst/>
+            </a:prstGeom>
+            <a:noFill/>
+            <a:ln w="9525">
+              <a:solidFill>
+                <a:schemeClr val="tx1"/>
+              </a:solidFill>
+              <a:miter lim="800000"/>
+              <a:headEnd/>
+              <a:tailEnd/>
+            </a:ln>
+            <a:effectLst/>
+          </p:spPr>
+          <p:txBody>
+            <a:bodyPr>
+              <a:spAutoFit/>
+            </a:bodyPr>
+            <a:lstStyle/>
+            <a:p>
+              <a:pPr algn="ctr">
+                <a:spcBef>
+                  <a:spcPct val="50000"/>
+                </a:spcBef>
+              </a:pPr>
+              <a:r>
+                <a:rPr lang="en-NZ" sz="2000" b="1" dirty="0" smtClean="0"/>
+                <a:t>nodeToDelete</a:t>
+              </a:r>
+              <a:endParaRPr lang="en-NZ" sz="2000" b="1" dirty="0"/>
+            </a:p>
+          </p:txBody>
+        </p:sp>
+        <p:sp>
+          <p:nvSpPr>
+            <p:cNvPr id="20" name="Line 22"/>
+            <p:cNvSpPr>
+              <a:spLocks noChangeShapeType="1"/>
+            </p:cNvSpPr>
+            <p:nvPr/>
+          </p:nvSpPr>
+          <p:spPr bwMode="auto">
+            <a:xfrm flipV="1">
+              <a:off x="5650242" y="5373688"/>
+              <a:ext cx="0" cy="720725"/>
+            </a:xfrm>
+            <a:prstGeom prst="line">
+              <a:avLst/>
+            </a:prstGeom>
+            <a:noFill/>
+            <a:ln w="9525">
+              <a:solidFill>
+                <a:schemeClr val="tx1"/>
+              </a:solidFill>
+              <a:round/>
+              <a:headEnd/>
+              <a:tailEnd type="triangle" w="med" len="med"/>
+            </a:ln>
+            <a:effectLst/>
+          </p:spPr>
+          <p:txBody>
+            <a:bodyPr/>
+            <a:lstStyle/>
+            <a:p>
+              <a:endParaRPr lang="en-NZ"/>
+            </a:p>
+          </p:txBody>
+        </p:sp>
+      </p:grpSp>
+      <p:sp>
+        <p:nvSpPr>
+          <p:cNvPr id="21" name="Text Box 21"/>
+          <p:cNvSpPr txBox="1">
+            <a:spLocks noChangeArrowheads="1"/>
+          </p:cNvSpPr>
+          <p:nvPr/>
+        </p:nvSpPr>
+        <p:spPr bwMode="auto">
+          <a:xfrm>
+            <a:off x="2830167" y="2574220"/>
+            <a:ext cx="1800028" cy="400110"/>
+          </a:xfrm>
+          <a:prstGeom prst="rect">
+            <a:avLst/>
+          </a:prstGeom>
+          <a:noFill/>
+          <a:ln w="9525">
+            <a:solidFill>
+              <a:schemeClr val="tx1"/>
+            </a:solidFill>
+            <a:miter lim="800000"/>
+            <a:headEnd/>
+            <a:tailEnd/>
+          </a:ln>
+          <a:effectLst/>
+        </p:spPr>
+        <p:txBody>
+          <a:bodyPr wrap="square">
+            <a:spAutoFit/>
+          </a:bodyPr>
+          <a:lstStyle/>
+          <a:p>
+            <a:pPr algn="ctr">
+              <a:spcBef>
+                <a:spcPct val="50000"/>
+              </a:spcBef>
+            </a:pPr>
+            <a:r>
+              <a:rPr lang="en-NZ" sz="2000" b="1" dirty="0" smtClean="0"/>
+              <a:t>nodeWalker</a:t>
+            </a:r>
+            <a:endParaRPr lang="en-NZ" sz="2000" b="1" dirty="0"/>
+          </a:p>
+        </p:txBody>
+      </p:sp>
+      <p:sp>
+        <p:nvSpPr>
+          <p:cNvPr id="22" name="Line 23"/>
+          <p:cNvSpPr>
+            <a:spLocks noChangeShapeType="1"/>
+          </p:cNvSpPr>
+          <p:nvPr/>
+        </p:nvSpPr>
+        <p:spPr bwMode="auto">
+          <a:xfrm>
             <a:off x="3641130" y="2987181"/>
             <a:ext cx="1" cy="1044605"/>
           </a:xfrm>
@@ -14331,7 +14613,7 @@
 </p:sld>
 </file>
 
-<file path=ppt/slides/slide26.xml><?xml version="1.0" encoding="utf-8"?>
+<file path=ppt/slides/slide27.xml><?xml version="1.0" encoding="utf-8"?>
 <p:sld xmlns:a="http://schemas.openxmlformats.org/drawingml/2006/main" xmlns:r="http://schemas.openxmlformats.org/officeDocument/2006/relationships" xmlns:p="http://schemas.openxmlformats.org/presentationml/2006/main">
   <p:cSld>
     <p:bg>
@@ -15185,7 +15467,7 @@
 </p:sld>
 </file>
 
-<file path=ppt/slides/slide27.xml><?xml version="1.0" encoding="utf-8"?>
+<file path=ppt/slides/slide28.xml><?xml version="1.0" encoding="utf-8"?>
 <p:sld xmlns:a="http://schemas.openxmlformats.org/drawingml/2006/main" xmlns:r="http://schemas.openxmlformats.org/officeDocument/2006/relationships" xmlns:p="http://schemas.openxmlformats.org/presentationml/2006/main">
   <p:cSld>
     <p:bg>
@@ -15881,7 +16163,7 @@
 </p:sld>
 </file>
 
-<file path=ppt/slides/slide28.xml><?xml version="1.0" encoding="utf-8"?>
+<file path=ppt/slides/slide29.xml><?xml version="1.0" encoding="utf-8"?>
 <p:sld xmlns:a="http://schemas.openxmlformats.org/drawingml/2006/main" xmlns:r="http://schemas.openxmlformats.org/officeDocument/2006/relationships" xmlns:p="http://schemas.openxmlformats.org/presentationml/2006/main">
   <p:cSld>
     <p:bg>
@@ -16233,7 +16515,174 @@
 </p:sld>
 </file>
 
-<file path=ppt/slides/slide29.xml><?xml version="1.0" encoding="utf-8"?>
+<file path=ppt/slides/slide3.xml><?xml version="1.0" encoding="utf-8"?>
+<p:sld xmlns:a="http://schemas.openxmlformats.org/drawingml/2006/main" xmlns:r="http://schemas.openxmlformats.org/officeDocument/2006/relationships" xmlns:p="http://schemas.openxmlformats.org/presentationml/2006/main">
+  <p:cSld>
+    <p:bg>
+      <p:bgPr>
+        <a:solidFill>
+          <a:schemeClr val="accent5">
+            <a:lumMod val="60000"/>
+            <a:lumOff val="40000"/>
+          </a:schemeClr>
+        </a:solidFill>
+        <a:effectLst/>
+      </p:bgPr>
+    </p:bg>
+    <p:spTree>
+      <p:nvGrpSpPr>
+        <p:cNvPr id="1" name=""/>
+        <p:cNvGrpSpPr/>
+        <p:nvPr/>
+      </p:nvGrpSpPr>
+      <p:grpSpPr>
+        <a:xfrm>
+          <a:off x="0" y="0"/>
+          <a:ext cx="0" cy="0"/>
+          <a:chOff x="0" y="0"/>
+          <a:chExt cx="0" cy="0"/>
+        </a:xfrm>
+      </p:grpSpPr>
+      <p:sp>
+        <p:nvSpPr>
+          <p:cNvPr id="5" name="Rectangle 4"/>
+          <p:cNvSpPr/>
+          <p:nvPr/>
+        </p:nvSpPr>
+        <p:spPr>
+          <a:xfrm>
+            <a:off x="6096" y="6096"/>
+            <a:ext cx="9144000" cy="4301177"/>
+          </a:xfrm>
+          <a:prstGeom prst="rect">
+            <a:avLst/>
+          </a:prstGeom>
+          <a:noFill/>
+        </p:spPr>
+        <p:txBody>
+          <a:bodyPr wrap="square" lIns="68580" tIns="34290" rIns="68580" bIns="34290">
+            <a:spAutoFit/>
+          </a:bodyPr>
+          <a:lstStyle/>
+          <a:p>
+            <a:pPr algn="ctr"/>
+            <a:endParaRPr lang="en-US" sz="4000" b="1" dirty="0" smtClean="0"/>
+          </a:p>
+          <a:p>
+            <a:pPr lvl="1"/>
+            <a:r>
+              <a:rPr lang="en-US" sz="3500" b="1" dirty="0" smtClean="0"/>
+              <a:t>Static storage</a:t>
+            </a:r>
+          </a:p>
+          <a:p>
+            <a:pPr lvl="1"/>
+            <a:endParaRPr lang="en-US" sz="2500" dirty="0" smtClean="0"/>
+          </a:p>
+          <a:p>
+            <a:pPr marL="1657350" lvl="2" indent="-742950">
+              <a:buFont typeface="Arial" panose="020B0604020202020204" pitchFamily="34" charset="0"/>
+              <a:buChar char="•"/>
+            </a:pPr>
+            <a:r>
+              <a:rPr lang="en-US" sz="2500" dirty="0" smtClean="0"/>
+              <a:t>Arrays</a:t>
+            </a:r>
+          </a:p>
+          <a:p>
+            <a:pPr marL="2114550" lvl="3" indent="-742950">
+              <a:buFont typeface="Arial" panose="020B0604020202020204" pitchFamily="34" charset="0"/>
+              <a:buChar char="•"/>
+            </a:pPr>
+            <a:r>
+              <a:rPr lang="en-US" sz="2500" dirty="0" smtClean="0"/>
+              <a:t>Advantages:</a:t>
+            </a:r>
+          </a:p>
+          <a:p>
+            <a:pPr marL="2571750" lvl="4" indent="-742950">
+              <a:buFont typeface="Arial" panose="020B0604020202020204" pitchFamily="34" charset="0"/>
+              <a:buChar char="•"/>
+            </a:pPr>
+            <a:r>
+              <a:rPr lang="en-US" sz="2000" dirty="0" smtClean="0"/>
+              <a:t>Easy to create and initialise</a:t>
+            </a:r>
+          </a:p>
+          <a:p>
+            <a:pPr marL="2571750" lvl="4" indent="-742950">
+              <a:buFont typeface="Arial" panose="020B0604020202020204" pitchFamily="34" charset="0"/>
+              <a:buChar char="•"/>
+            </a:pPr>
+            <a:r>
+              <a:rPr lang="en-US" sz="2000" dirty="0" smtClean="0"/>
+              <a:t>Easy to index into</a:t>
+            </a:r>
+          </a:p>
+          <a:p>
+            <a:pPr marL="2571750" lvl="4" indent="-742950">
+              <a:buFont typeface="Arial" panose="020B0604020202020204" pitchFamily="34" charset="0"/>
+              <a:buChar char="•"/>
+            </a:pPr>
+            <a:r>
+              <a:rPr lang="en-US" sz="2000" dirty="0" smtClean="0"/>
+              <a:t>Built into most development environments</a:t>
+            </a:r>
+            <a:endParaRPr lang="en-US" sz="2500" dirty="0"/>
+          </a:p>
+          <a:p>
+            <a:pPr marL="2114550" lvl="3" indent="-742950">
+              <a:buFont typeface="Arial" panose="020B0604020202020204" pitchFamily="34" charset="0"/>
+              <a:buChar char="•"/>
+            </a:pPr>
+            <a:r>
+              <a:rPr lang="en-US" sz="2500" dirty="0" smtClean="0"/>
+              <a:t>Disadvantages:</a:t>
+            </a:r>
+          </a:p>
+          <a:p>
+            <a:pPr marL="2571750" lvl="4" indent="-742950">
+              <a:buFont typeface="Arial" panose="020B0604020202020204" pitchFamily="34" charset="0"/>
+              <a:buChar char="•"/>
+            </a:pPr>
+            <a:r>
+              <a:rPr lang="en-US" sz="2000" dirty="0" smtClean="0"/>
+              <a:t>Inflexible size</a:t>
+            </a:r>
+          </a:p>
+          <a:p>
+            <a:pPr marL="2571750" lvl="4" indent="-742950">
+              <a:buFont typeface="Arial" panose="020B0604020202020204" pitchFamily="34" charset="0"/>
+              <a:buChar char="•"/>
+            </a:pPr>
+            <a:r>
+              <a:rPr lang="en-US" sz="2000" dirty="0" smtClean="0"/>
+              <a:t>Awkward for deletion</a:t>
+            </a:r>
+          </a:p>
+        </p:txBody>
+      </p:sp>
+    </p:spTree>
+    <p:extLst>
+      <p:ext uri="{BB962C8B-B14F-4D97-AF65-F5344CB8AC3E}">
+        <p14:creationId xmlns:p14="http://schemas.microsoft.com/office/powerpoint/2010/main" val="1345976548"/>
+      </p:ext>
+    </p:extLst>
+  </p:cSld>
+  <p:clrMapOvr>
+    <a:masterClrMapping/>
+  </p:clrMapOvr>
+  <p:timing>
+    <p:tnLst>
+      <p:par>
+        <p:cTn id="1" dur="indefinite" restart="never" nodeType="tmRoot"/>
+      </p:par>
+    </p:tnLst>
+  </p:timing>
+</p:sld>
+</file>
+
+<file path=ppt/slides/slide30.xml><?xml version="1.0" encoding="utf-8"?>
 <p:sld xmlns:a="http://schemas.openxmlformats.org/drawingml/2006/main" xmlns:r="http://schemas.openxmlformats.org/officeDocument/2006/relationships" xmlns:p="http://schemas.openxmlformats.org/presentationml/2006/main">
   <p:cSld>
     <p:bg>
@@ -16350,7 +16799,7 @@
 </p:sld>
 </file>
 
-<file path=ppt/slides/slide3.xml><?xml version="1.0" encoding="utf-8"?>
+<file path=ppt/slides/slide31.xml><?xml version="1.0" encoding="utf-8"?>
 <p:sld xmlns:a="http://schemas.openxmlformats.org/drawingml/2006/main" xmlns:r="http://schemas.openxmlformats.org/officeDocument/2006/relationships" xmlns:p="http://schemas.openxmlformats.org/presentationml/2006/main">
   <p:cSld>
     <p:bg>
@@ -16387,173 +16836,6 @@
         <p:spPr>
           <a:xfrm>
             <a:off x="6096" y="6096"/>
-            <a:ext cx="9144000" cy="4301177"/>
-          </a:xfrm>
-          <a:prstGeom prst="rect">
-            <a:avLst/>
-          </a:prstGeom>
-          <a:noFill/>
-        </p:spPr>
-        <p:txBody>
-          <a:bodyPr wrap="square" lIns="68580" tIns="34290" rIns="68580" bIns="34290">
-            <a:spAutoFit/>
-          </a:bodyPr>
-          <a:lstStyle/>
-          <a:p>
-            <a:pPr algn="ctr"/>
-            <a:endParaRPr lang="en-US" sz="4000" b="1" dirty="0" smtClean="0"/>
-          </a:p>
-          <a:p>
-            <a:pPr lvl="1"/>
-            <a:r>
-              <a:rPr lang="en-US" sz="3500" b="1" dirty="0" smtClean="0"/>
-              <a:t>Static storage</a:t>
-            </a:r>
-          </a:p>
-          <a:p>
-            <a:pPr lvl="1"/>
-            <a:endParaRPr lang="en-US" sz="2500" dirty="0" smtClean="0"/>
-          </a:p>
-          <a:p>
-            <a:pPr marL="1657350" lvl="2" indent="-742950">
-              <a:buFont typeface="Arial" panose="020B0604020202020204" pitchFamily="34" charset="0"/>
-              <a:buChar char="•"/>
-            </a:pPr>
-            <a:r>
-              <a:rPr lang="en-US" sz="2500" dirty="0" smtClean="0"/>
-              <a:t>Arrays</a:t>
-            </a:r>
-          </a:p>
-          <a:p>
-            <a:pPr marL="2114550" lvl="3" indent="-742950">
-              <a:buFont typeface="Arial" panose="020B0604020202020204" pitchFamily="34" charset="0"/>
-              <a:buChar char="•"/>
-            </a:pPr>
-            <a:r>
-              <a:rPr lang="en-US" sz="2500" dirty="0" smtClean="0"/>
-              <a:t>Advantages:</a:t>
-            </a:r>
-          </a:p>
-          <a:p>
-            <a:pPr marL="2571750" lvl="4" indent="-742950">
-              <a:buFont typeface="Arial" panose="020B0604020202020204" pitchFamily="34" charset="0"/>
-              <a:buChar char="•"/>
-            </a:pPr>
-            <a:r>
-              <a:rPr lang="en-US" sz="2000" dirty="0" smtClean="0"/>
-              <a:t>Easy to create and initialise</a:t>
-            </a:r>
-          </a:p>
-          <a:p>
-            <a:pPr marL="2571750" lvl="4" indent="-742950">
-              <a:buFont typeface="Arial" panose="020B0604020202020204" pitchFamily="34" charset="0"/>
-              <a:buChar char="•"/>
-            </a:pPr>
-            <a:r>
-              <a:rPr lang="en-US" sz="2000" dirty="0" smtClean="0"/>
-              <a:t>Easy to index into</a:t>
-            </a:r>
-          </a:p>
-          <a:p>
-            <a:pPr marL="2571750" lvl="4" indent="-742950">
-              <a:buFont typeface="Arial" panose="020B0604020202020204" pitchFamily="34" charset="0"/>
-              <a:buChar char="•"/>
-            </a:pPr>
-            <a:r>
-              <a:rPr lang="en-US" sz="2000" dirty="0" smtClean="0"/>
-              <a:t>Built into most development environments</a:t>
-            </a:r>
-            <a:endParaRPr lang="en-US" sz="2500" dirty="0"/>
-          </a:p>
-          <a:p>
-            <a:pPr marL="2114550" lvl="3" indent="-742950">
-              <a:buFont typeface="Arial" panose="020B0604020202020204" pitchFamily="34" charset="0"/>
-              <a:buChar char="•"/>
-            </a:pPr>
-            <a:r>
-              <a:rPr lang="en-US" sz="2500" dirty="0" smtClean="0"/>
-              <a:t>Disadvantages:</a:t>
-            </a:r>
-          </a:p>
-          <a:p>
-            <a:pPr marL="2571750" lvl="4" indent="-742950">
-              <a:buFont typeface="Arial" panose="020B0604020202020204" pitchFamily="34" charset="0"/>
-              <a:buChar char="•"/>
-            </a:pPr>
-            <a:r>
-              <a:rPr lang="en-US" sz="2000" dirty="0" smtClean="0"/>
-              <a:t>Inflexible size</a:t>
-            </a:r>
-          </a:p>
-          <a:p>
-            <a:pPr marL="2571750" lvl="4" indent="-742950">
-              <a:buFont typeface="Arial" panose="020B0604020202020204" pitchFamily="34" charset="0"/>
-              <a:buChar char="•"/>
-            </a:pPr>
-            <a:r>
-              <a:rPr lang="en-US" sz="2000" dirty="0" smtClean="0"/>
-              <a:t>Awkward for deletion</a:t>
-            </a:r>
-          </a:p>
-        </p:txBody>
-      </p:sp>
-    </p:spTree>
-    <p:extLst>
-      <p:ext uri="{BB962C8B-B14F-4D97-AF65-F5344CB8AC3E}">
-        <p14:creationId xmlns:p14="http://schemas.microsoft.com/office/powerpoint/2010/main" val="1345976548"/>
-      </p:ext>
-    </p:extLst>
-  </p:cSld>
-  <p:clrMapOvr>
-    <a:masterClrMapping/>
-  </p:clrMapOvr>
-  <p:timing>
-    <p:tnLst>
-      <p:par>
-        <p:cTn id="1" dur="indefinite" restart="never" nodeType="tmRoot"/>
-      </p:par>
-    </p:tnLst>
-  </p:timing>
-</p:sld>
-</file>
-
-<file path=ppt/slides/slide30.xml><?xml version="1.0" encoding="utf-8"?>
-<p:sld xmlns:a="http://schemas.openxmlformats.org/drawingml/2006/main" xmlns:r="http://schemas.openxmlformats.org/officeDocument/2006/relationships" xmlns:p="http://schemas.openxmlformats.org/presentationml/2006/main">
-  <p:cSld>
-    <p:bg>
-      <p:bgPr>
-        <a:solidFill>
-          <a:schemeClr val="accent5">
-            <a:lumMod val="60000"/>
-            <a:lumOff val="40000"/>
-          </a:schemeClr>
-        </a:solidFill>
-        <a:effectLst/>
-      </p:bgPr>
-    </p:bg>
-    <p:spTree>
-      <p:nvGrpSpPr>
-        <p:cNvPr id="1" name=""/>
-        <p:cNvGrpSpPr/>
-        <p:nvPr/>
-      </p:nvGrpSpPr>
-      <p:grpSpPr>
-        <a:xfrm>
-          <a:off x="0" y="0"/>
-          <a:ext cx="0" cy="0"/>
-          <a:chOff x="0" y="0"/>
-          <a:chExt cx="0" cy="0"/>
-        </a:xfrm>
-      </p:grpSpPr>
-      <p:sp>
-        <p:nvSpPr>
-          <p:cNvPr id="5" name="Rectangle 4"/>
-          <p:cNvSpPr/>
-          <p:nvPr/>
-        </p:nvSpPr>
-        <p:spPr>
-          <a:xfrm>
-            <a:off x="6096" y="6096"/>
             <a:ext cx="9144000" cy="1608133"/>
           </a:xfrm>
           <a:prstGeom prst="rect">
@@ -16576,7 +16858,6 @@
               <a:rPr lang="en-US" sz="3500" b="1" dirty="0" smtClean="0"/>
               <a:t>PelletList.h</a:t>
             </a:r>
-            <a:endParaRPr lang="en-US" sz="3500" b="1" dirty="0" smtClean="0"/>
           </a:p>
           <a:p>
             <a:pPr lvl="2"/>
@@ -16634,7 +16915,7 @@
 </p:sld>
 </file>
 
-<file path=ppt/slides/slide31.xml><?xml version="1.0" encoding="utf-8"?>
+<file path=ppt/slides/slide32.xml><?xml version="1.0" encoding="utf-8"?>
 <p:sld xmlns:a="http://schemas.openxmlformats.org/drawingml/2006/main" xmlns:r="http://schemas.openxmlformats.org/officeDocument/2006/relationships" xmlns:p="http://schemas.openxmlformats.org/presentationml/2006/main">
   <p:cSld>
     <p:bg>
@@ -16808,7 +17089,7 @@
 </p:sld>
 </file>
 
-<file path=ppt/slides/slide32.xml><?xml version="1.0" encoding="utf-8"?>
+<file path=ppt/slides/slide33.xml><?xml version="1.0" encoding="utf-8"?>
 <p:sld xmlns:a="http://schemas.openxmlformats.org/drawingml/2006/main" xmlns:r="http://schemas.openxmlformats.org/officeDocument/2006/relationships" xmlns:p="http://schemas.openxmlformats.org/presentationml/2006/main">
   <p:cSld>
     <p:bg>

</xml_diff>

<commit_message>
Update 3.1 Linked Lists
</commit_message>
<xml_diff>
--- a/Programming 4/03.1 Linked Lists/03.1 Linked Lists.pptx
+++ b/Programming 4/03.1 Linked Lists/03.1 Linked Lists.pptx
@@ -241,7 +241,7 @@
           <a:p>
             <a:fld id="{5C6122FC-D7E3-43B5-94FB-2148EE5CCFED}" type="datetimeFigureOut">
               <a:rPr lang="en-NZ" smtClean="0"/>
-              <a:t>6/08/2019</a:t>
+              <a:t>7/08/19</a:t>
             </a:fld>
             <a:endParaRPr lang="en-NZ"/>
           </a:p>
@@ -557,14 +557,6 @@
               <a:buFont typeface="Arial" charset="0"/>
               <a:buChar char="•"/>
             </a:pPr>
-            <a:r>
-              <a:rPr lang="en-US" dirty="0" smtClean="0"/>
-              <a:t>Objects – enemies, treasure, </a:t>
-            </a:r>
-            <a:r>
-              <a:rPr lang="en-US" dirty="0" smtClean="0"/>
-              <a:t>power ups</a:t>
-            </a:r>
             <a:endParaRPr lang="en-US" dirty="0" smtClean="0"/>
           </a:p>
         </p:txBody>
@@ -653,78 +645,6 @@
               <a:buFont typeface="Arial" panose="020B0604020202020204" pitchFamily="34" charset="0"/>
               <a:buChar char="•"/>
             </a:pPr>
-            <a:r>
-              <a:rPr lang="en-US" dirty="0" smtClean="0"/>
-              <a:t>nodeWalker</a:t>
-            </a:r>
-            <a:r>
-              <a:rPr lang="en-US" baseline="0" dirty="0" smtClean="0"/>
-              <a:t> is a pointer</a:t>
-            </a:r>
-          </a:p>
-          <a:p>
-            <a:pPr marL="171450" indent="-171450">
-              <a:buFont typeface="Arial" panose="020B0604020202020204" pitchFamily="34" charset="0"/>
-              <a:buChar char="•"/>
-            </a:pPr>
-            <a:endParaRPr lang="en-US" baseline="0" dirty="0" smtClean="0"/>
-          </a:p>
-          <a:p>
-            <a:pPr marL="171450" indent="-171450">
-              <a:buFont typeface="Arial" panose="020B0604020202020204" pitchFamily="34" charset="0"/>
-              <a:buChar char="•"/>
-            </a:pPr>
-            <a:r>
-              <a:rPr lang="en-US" baseline="0" dirty="0" smtClean="0"/>
-              <a:t>It is 32 or 64 bits of memory that can hold a memory address, which should be the memory address of a Node</a:t>
-            </a:r>
-          </a:p>
-          <a:p>
-            <a:pPr marL="171450" indent="-171450">
-              <a:buFont typeface="Arial" panose="020B0604020202020204" pitchFamily="34" charset="0"/>
-              <a:buChar char="•"/>
-            </a:pPr>
-            <a:endParaRPr lang="en-US" baseline="0" dirty="0" smtClean="0"/>
-          </a:p>
-          <a:p>
-            <a:pPr marL="171450" indent="-171450">
-              <a:buFont typeface="Arial" panose="020B0604020202020204" pitchFamily="34" charset="0"/>
-              <a:buChar char="•"/>
-            </a:pPr>
-            <a:r>
-              <a:rPr lang="en-US" baseline="0" dirty="0" smtClean="0"/>
-              <a:t>It is not a Node</a:t>
-            </a:r>
-          </a:p>
-          <a:p>
-            <a:pPr marL="171450" indent="-171450">
-              <a:buFont typeface="Arial" panose="020B0604020202020204" pitchFamily="34" charset="0"/>
-              <a:buChar char="•"/>
-            </a:pPr>
-            <a:endParaRPr lang="en-US" baseline="0" dirty="0" smtClean="0"/>
-          </a:p>
-          <a:p>
-            <a:pPr marL="171450" indent="-171450">
-              <a:buFont typeface="Arial" panose="020B0604020202020204" pitchFamily="34" charset="0"/>
-              <a:buChar char="•"/>
-            </a:pPr>
-            <a:r>
-              <a:rPr lang="en-US" baseline="0" dirty="0" smtClean="0"/>
-              <a:t>It doesn’t have any of the properties of a Node, so what does it mean to say nodeWalker-&gt;Next?</a:t>
-            </a:r>
-          </a:p>
-          <a:p>
-            <a:pPr marL="171450" indent="-171450">
-              <a:buFont typeface="Arial" panose="020B0604020202020204" pitchFamily="34" charset="0"/>
-              <a:buChar char="•"/>
-            </a:pPr>
-            <a:endParaRPr lang="en-US" baseline="0" dirty="0" smtClean="0"/>
-          </a:p>
-          <a:p>
-            <a:pPr marL="171450" indent="-171450">
-              <a:buFont typeface="Arial" panose="020B0604020202020204" pitchFamily="34" charset="0"/>
-              <a:buChar char="•"/>
-            </a:pPr>
             <a:endParaRPr lang="en-US" dirty="0" smtClean="0"/>
           </a:p>
         </p:txBody>
@@ -813,27 +733,6 @@
               <a:buFont typeface="Arial" panose="020B0604020202020204" pitchFamily="34" charset="0"/>
               <a:buChar char="•"/>
             </a:pPr>
-            <a:r>
-              <a:rPr lang="en-US" dirty="0" smtClean="0"/>
-              <a:t>When</a:t>
-            </a:r>
-            <a:r>
-              <a:rPr lang="en-US" baseline="0" dirty="0" smtClean="0"/>
-              <a:t> we assign that value to nodeWalker, where is he now pointing? To the guy his guy was pointing to. That is, he has taken one step down the chain</a:t>
-            </a:r>
-          </a:p>
-          <a:p>
-            <a:pPr marL="171450" indent="-171450">
-              <a:buFont typeface="Arial" panose="020B0604020202020204" pitchFamily="34" charset="0"/>
-              <a:buChar char="•"/>
-            </a:pPr>
-            <a:endParaRPr lang="en-US" baseline="0" dirty="0" smtClean="0"/>
-          </a:p>
-          <a:p>
-            <a:pPr marL="171450" indent="-171450">
-              <a:buFont typeface="Arial" panose="020B0604020202020204" pitchFamily="34" charset="0"/>
-              <a:buChar char="•"/>
-            </a:pPr>
             <a:endParaRPr lang="en-US" dirty="0" smtClean="0"/>
           </a:p>
         </p:txBody>
@@ -922,31 +821,6 @@
               <a:buFont typeface="Arial" panose="020B0604020202020204" pitchFamily="34" charset="0"/>
               <a:buChar char="•"/>
             </a:pPr>
-            <a:r>
-              <a:rPr lang="en-US" dirty="0" smtClean="0"/>
-              <a:t>nodeWalker</a:t>
-            </a:r>
-            <a:r>
-              <a:rPr lang="en-US" baseline="0" dirty="0" smtClean="0"/>
-              <a:t> is pointing to node1</a:t>
-            </a:r>
-          </a:p>
-          <a:p>
-            <a:pPr marL="171450" indent="-171450">
-              <a:buFont typeface="Arial" panose="020B0604020202020204" pitchFamily="34" charset="0"/>
-              <a:buChar char="•"/>
-            </a:pPr>
-            <a:endParaRPr lang="en-US" baseline="0" dirty="0" smtClean="0"/>
-          </a:p>
-          <a:p>
-            <a:pPr marL="171450" indent="-171450">
-              <a:buFont typeface="Arial" panose="020B0604020202020204" pitchFamily="34" charset="0"/>
-              <a:buChar char="•"/>
-            </a:pPr>
-            <a:r>
-              <a:rPr lang="en-US" baseline="0" dirty="0" smtClean="0"/>
-              <a:t>The Next of node1 is the address of node2</a:t>
-            </a:r>
             <a:endParaRPr lang="en-US" dirty="0" smtClean="0"/>
           </a:p>
         </p:txBody>
@@ -1035,82 +909,6 @@
               <a:buFont typeface="Arial" panose="020B0604020202020204" pitchFamily="34" charset="0"/>
               <a:buChar char="•"/>
             </a:pPr>
-            <a:r>
-              <a:rPr lang="en-US" dirty="0" smtClean="0"/>
-              <a:t>nodeWalker = nodeWalker-&gt;Next</a:t>
-            </a:r>
-            <a:r>
-              <a:rPr lang="en-US" baseline="0" dirty="0" smtClean="0"/>
-              <a:t> points nodeWalker at node2</a:t>
-            </a:r>
-          </a:p>
-          <a:p>
-            <a:pPr marL="171450" indent="-171450">
-              <a:buFont typeface="Arial" panose="020B0604020202020204" pitchFamily="34" charset="0"/>
-              <a:buChar char="•"/>
-            </a:pPr>
-            <a:endParaRPr lang="en-US" baseline="0" dirty="0" smtClean="0"/>
-          </a:p>
-          <a:p>
-            <a:pPr marL="171450" indent="-171450">
-              <a:buFont typeface="Arial" panose="020B0604020202020204" pitchFamily="34" charset="0"/>
-              <a:buChar char="•"/>
-            </a:pPr>
-            <a:r>
-              <a:rPr lang="en-US" baseline="0" dirty="0" smtClean="0"/>
-              <a:t>What if we called nodeWalker-&gt;Next again?</a:t>
-            </a:r>
-          </a:p>
-          <a:p>
-            <a:pPr marL="171450" indent="-171450">
-              <a:buFont typeface="Arial" panose="020B0604020202020204" pitchFamily="34" charset="0"/>
-              <a:buChar char="•"/>
-            </a:pPr>
-            <a:endParaRPr lang="en-US" baseline="0" dirty="0" smtClean="0"/>
-          </a:p>
-          <a:p>
-            <a:pPr marL="171450" indent="-171450">
-              <a:buFont typeface="Arial" panose="020B0604020202020204" pitchFamily="34" charset="0"/>
-              <a:buChar char="•"/>
-            </a:pPr>
-            <a:r>
-              <a:rPr lang="en-US" baseline="0" dirty="0" smtClean="0"/>
-              <a:t>Node2, being at the end of the list, his Next = nullptr</a:t>
-            </a:r>
-          </a:p>
-          <a:p>
-            <a:pPr marL="171450" indent="-171450">
-              <a:buFont typeface="Arial" panose="020B0604020202020204" pitchFamily="34" charset="0"/>
-              <a:buChar char="•"/>
-            </a:pPr>
-            <a:endParaRPr lang="en-US" baseline="0" dirty="0" smtClean="0"/>
-          </a:p>
-          <a:p>
-            <a:pPr marL="171450" indent="-171450">
-              <a:buFont typeface="Arial" panose="020B0604020202020204" pitchFamily="34" charset="0"/>
-              <a:buChar char="•"/>
-            </a:pPr>
-            <a:r>
-              <a:rPr lang="en-US" baseline="0" dirty="0" smtClean="0"/>
-              <a:t>So if you say nodeWalker = nodeWalker-&gt;Next again, nodeWalker is nullptr</a:t>
-            </a:r>
-          </a:p>
-          <a:p>
-            <a:pPr marL="171450" indent="-171450">
-              <a:buFont typeface="Arial" panose="020B0604020202020204" pitchFamily="34" charset="0"/>
-              <a:buChar char="•"/>
-            </a:pPr>
-            <a:endParaRPr lang="en-US" baseline="0" dirty="0" smtClean="0"/>
-          </a:p>
-          <a:p>
-            <a:pPr marL="171450" indent="-171450">
-              <a:buFont typeface="Arial" panose="020B0604020202020204" pitchFamily="34" charset="0"/>
-              <a:buChar char="•"/>
-            </a:pPr>
-            <a:r>
-              <a:rPr lang="en-US" baseline="0" dirty="0" smtClean="0"/>
-              <a:t>That’s how you drop/break out of the loop</a:t>
-            </a:r>
             <a:endParaRPr lang="en-US" dirty="0" smtClean="0"/>
           </a:p>
         </p:txBody>
@@ -1199,82 +997,6 @@
               <a:buFont typeface="Arial" panose="020B0604020202020204" pitchFamily="34" charset="0"/>
               <a:buChar char="•"/>
             </a:pPr>
-            <a:r>
-              <a:rPr lang="en-US" dirty="0" smtClean="0"/>
-              <a:t>How</a:t>
-            </a:r>
-            <a:r>
-              <a:rPr lang="en-US" baseline="0" dirty="0" smtClean="0"/>
-              <a:t> can we talk to the current last node? Tail is pointing to him</a:t>
-            </a:r>
-          </a:p>
-          <a:p>
-            <a:pPr marL="171450" indent="-171450">
-              <a:buFont typeface="Arial" panose="020B0604020202020204" pitchFamily="34" charset="0"/>
-              <a:buChar char="•"/>
-            </a:pPr>
-            <a:endParaRPr lang="en-US" baseline="0" dirty="0" smtClean="0"/>
-          </a:p>
-          <a:p>
-            <a:pPr marL="171450" indent="-171450">
-              <a:buFont typeface="Arial" panose="020B0604020202020204" pitchFamily="34" charset="0"/>
-              <a:buChar char="•"/>
-            </a:pPr>
-            <a:r>
-              <a:rPr lang="en-US" baseline="0" dirty="0" smtClean="0"/>
-              <a:t>Remember, tail-&gt;Next means the Next of the guy tail is pointing to</a:t>
-            </a:r>
-          </a:p>
-          <a:p>
-            <a:pPr marL="171450" indent="-171450">
-              <a:buFont typeface="Arial" panose="020B0604020202020204" pitchFamily="34" charset="0"/>
-              <a:buChar char="•"/>
-            </a:pPr>
-            <a:endParaRPr lang="en-US" baseline="0" dirty="0" smtClean="0"/>
-          </a:p>
-          <a:p>
-            <a:pPr marL="171450" indent="-171450">
-              <a:buFont typeface="Arial" panose="020B0604020202020204" pitchFamily="34" charset="0"/>
-              <a:buChar char="•"/>
-            </a:pPr>
-            <a:r>
-              <a:rPr lang="en-US" baseline="0" dirty="0" smtClean="0"/>
-              <a:t>What if there aren’t any nodes in the list?</a:t>
-            </a:r>
-          </a:p>
-          <a:p>
-            <a:pPr marL="628650" lvl="1" indent="-171450">
-              <a:buFont typeface="Arial" panose="020B0604020202020204" pitchFamily="34" charset="0"/>
-              <a:buChar char="•"/>
-            </a:pPr>
-            <a:r>
-              <a:rPr lang="en-US" baseline="0" dirty="0" smtClean="0"/>
-              <a:t>What is the value of tail? Nullptr</a:t>
-            </a:r>
-          </a:p>
-          <a:p>
-            <a:pPr marL="628650" lvl="1" indent="-171450">
-              <a:buFont typeface="Arial" panose="020B0604020202020204" pitchFamily="34" charset="0"/>
-              <a:buChar char="•"/>
-            </a:pPr>
-            <a:r>
-              <a:rPr lang="en-US" baseline="0" dirty="0" smtClean="0"/>
-              <a:t>What will happen when you say tail-&gt;Next? Boom!!!</a:t>
-            </a:r>
-          </a:p>
-          <a:p>
-            <a:pPr marL="628650" lvl="1" indent="-171450">
-              <a:buFont typeface="Arial" panose="020B0604020202020204" pitchFamily="34" charset="0"/>
-              <a:buChar char="•"/>
-            </a:pPr>
-            <a:r>
-              <a:rPr lang="en-US" dirty="0" smtClean="0"/>
-              <a:t>What can you do? Recognise that this is a special</a:t>
-            </a:r>
-            <a:r>
-              <a:rPr lang="en-US" baseline="0" dirty="0" smtClean="0"/>
-              <a:t> case. This is very common. We have the ordinary thing we do most of the time and we have the boundary cases</a:t>
-            </a:r>
             <a:endParaRPr lang="en-US" dirty="0" smtClean="0"/>
           </a:p>
         </p:txBody>
@@ -1363,14 +1085,6 @@
               <a:buFont typeface="Arial" panose="020B0604020202020204" pitchFamily="34" charset="0"/>
               <a:buChar char="•"/>
             </a:pPr>
-            <a:r>
-              <a:rPr lang="en-US" dirty="0" smtClean="0"/>
-              <a:t>What flow of control structure will we</a:t>
-            </a:r>
-            <a:r>
-              <a:rPr lang="en-US" baseline="0" dirty="0" smtClean="0"/>
-              <a:t> nee? If else statement</a:t>
-            </a:r>
             <a:endParaRPr lang="en-US" dirty="0" smtClean="0"/>
           </a:p>
         </p:txBody>
@@ -1459,64 +1173,6 @@
               <a:buFont typeface="Arial" panose="020B0604020202020204" pitchFamily="34" charset="0"/>
               <a:buChar char="•"/>
             </a:pPr>
-            <a:r>
-              <a:rPr lang="en-US" dirty="0" smtClean="0"/>
-              <a:t>Actual code – use this in your practical today</a:t>
-            </a:r>
-          </a:p>
-          <a:p>
-            <a:pPr marL="171450" indent="-171450">
-              <a:buFont typeface="Arial" panose="020B0604020202020204" pitchFamily="34" charset="0"/>
-              <a:buChar char="•"/>
-            </a:pPr>
-            <a:endParaRPr lang="en-US" dirty="0" smtClean="0"/>
-          </a:p>
-          <a:p>
-            <a:pPr marL="171450" indent="-171450">
-              <a:buFont typeface="Arial" panose="020B0604020202020204" pitchFamily="34" charset="0"/>
-              <a:buChar char="•"/>
-            </a:pPr>
-            <a:r>
-              <a:rPr lang="en-US" dirty="0" smtClean="0"/>
-              <a:t>What </a:t>
-            </a:r>
-            <a:r>
-              <a:rPr lang="en-US" dirty="0" smtClean="0"/>
-              <a:t>flow of control structure will we</a:t>
-            </a:r>
-            <a:r>
-              <a:rPr lang="en-US" baseline="0" dirty="0" smtClean="0"/>
-              <a:t> </a:t>
-            </a:r>
-            <a:r>
-              <a:rPr lang="en-US" baseline="0" dirty="0" smtClean="0"/>
-              <a:t>need? </a:t>
-            </a:r>
-            <a:r>
-              <a:rPr lang="en-US" baseline="0" dirty="0" smtClean="0"/>
-              <a:t>If else </a:t>
-            </a:r>
-            <a:r>
-              <a:rPr lang="en-US" baseline="0" dirty="0" smtClean="0"/>
-              <a:t>statement</a:t>
-            </a:r>
-          </a:p>
-          <a:p>
-            <a:pPr marL="171450" indent="-171450">
-              <a:buFont typeface="Arial" panose="020B0604020202020204" pitchFamily="34" charset="0"/>
-              <a:buChar char="•"/>
-            </a:pPr>
-            <a:endParaRPr lang="en-US" baseline="0" dirty="0" smtClean="0"/>
-          </a:p>
-          <a:p>
-            <a:pPr marL="171450" indent="-171450">
-              <a:buFont typeface="Arial" panose="020B0604020202020204" pitchFamily="34" charset="0"/>
-              <a:buChar char="•"/>
-            </a:pPr>
-            <a:r>
-              <a:rPr lang="en-US" baseline="0" dirty="0" smtClean="0"/>
-              <a:t>newNode is the Pellet being passed in</a:t>
-            </a:r>
             <a:endParaRPr lang="en-US" dirty="0" smtClean="0"/>
           </a:p>
         </p:txBody>
@@ -1601,17 +1257,6 @@
           <a:bodyPr/>
           <a:lstStyle/>
           <a:p>
-            <a:pPr marL="171450" indent="-171450">
-              <a:buFont typeface="Arial" charset="0"/>
-              <a:buChar char="•"/>
-            </a:pPr>
-            <a:r>
-              <a:rPr lang="en-US" dirty="0" smtClean="0"/>
-              <a:t>To delete monster2</a:t>
-            </a:r>
-            <a:endParaRPr lang="en-US" baseline="0" dirty="0" smtClean="0"/>
-          </a:p>
-          <a:p>
             <a:pPr marL="0" indent="0">
               <a:buFont typeface="Arial" charset="0"/>
               <a:buNone/>
@@ -1700,17 +1345,6 @@
           <a:bodyPr/>
           <a:lstStyle/>
           <a:p>
-            <a:pPr marL="171450" indent="-171450">
-              <a:buFont typeface="Arial" charset="0"/>
-              <a:buChar char="•"/>
-            </a:pPr>
-            <a:r>
-              <a:rPr lang="en-US" dirty="0" smtClean="0"/>
-              <a:t>To delete monster2</a:t>
-            </a:r>
-            <a:endParaRPr lang="en-US" baseline="0" dirty="0" smtClean="0"/>
-          </a:p>
-          <a:p>
             <a:pPr marL="0" indent="0">
               <a:buFont typeface="Arial" charset="0"/>
               <a:buNone/>
@@ -1898,38 +1532,6 @@
               <a:buFont typeface="Arial" charset="0"/>
               <a:buChar char="•"/>
             </a:pPr>
-            <a:r>
-              <a:rPr lang="en-US" dirty="0" smtClean="0"/>
-              <a:t>The</a:t>
-            </a:r>
-            <a:r>
-              <a:rPr lang="en-US" baseline="0" dirty="0" smtClean="0"/>
-              <a:t> size of the array has to be declared in advanced</a:t>
-            </a:r>
-          </a:p>
-          <a:p>
-            <a:pPr marL="628650" lvl="1" indent="-171450">
-              <a:buFont typeface="Arial" charset="0"/>
-              <a:buChar char="•"/>
-            </a:pPr>
-            <a:r>
-              <a:rPr lang="en-US" baseline="0" dirty="0" smtClean="0"/>
-              <a:t>Causes problems such as the array is too small and can’t hold enough items</a:t>
-            </a:r>
-          </a:p>
-          <a:p>
-            <a:pPr marL="628650" lvl="1" indent="-171450">
-              <a:buFont typeface="Arial" charset="0"/>
-              <a:buChar char="•"/>
-            </a:pPr>
-            <a:r>
-              <a:rPr lang="en-US" baseline="0" dirty="0" smtClean="0"/>
-              <a:t>Or the array is too large and </a:t>
-            </a:r>
-            <a:r>
-              <a:rPr lang="en-US" baseline="0" smtClean="0"/>
-              <a:t>is wasteful</a:t>
-            </a:r>
             <a:endParaRPr lang="en-US" dirty="0" smtClean="0"/>
           </a:p>
         </p:txBody>
@@ -2226,7 +1828,6 @@
               <a:rPr lang="en-US" baseline="0" dirty="0" smtClean="0"/>
               <a:t> action</a:t>
             </a:r>
-            <a:endParaRPr lang="en-US" baseline="0" dirty="0" smtClean="0"/>
           </a:p>
         </p:txBody>
       </p:sp>
@@ -2326,13 +1927,8 @@
             </a:pPr>
             <a:r>
               <a:rPr lang="en-US" baseline="0" dirty="0" smtClean="0"/>
-              <a:t>NodeWalker = </a:t>
-            </a:r>
-            <a:r>
-              <a:rPr lang="en-US" baseline="0" dirty="0" smtClean="0"/>
-              <a:t>head</a:t>
-            </a:r>
-            <a:endParaRPr lang="en-US" baseline="0" dirty="0" smtClean="0"/>
+              <a:t>NodeWalker = head</a:t>
+            </a:r>
           </a:p>
         </p:txBody>
       </p:sp>
@@ -2422,11 +2018,7 @@
             </a:pPr>
             <a:r>
               <a:rPr lang="en-US" baseline="0" dirty="0" smtClean="0"/>
-              <a:t>Move </a:t>
-            </a:r>
-            <a:r>
-              <a:rPr lang="en-US" baseline="0" dirty="0" smtClean="0"/>
-              <a:t>along</a:t>
+              <a:t>Move along</a:t>
             </a:r>
           </a:p>
         </p:txBody>
@@ -3026,75 +2618,6 @@
               <a:buFont typeface="Arial" charset="0"/>
               <a:buChar char="•"/>
             </a:pPr>
-            <a:r>
-              <a:rPr lang="en-US" dirty="0" smtClean="0"/>
-              <a:t>You can add and remove items from your list as required – this</a:t>
-            </a:r>
-            <a:r>
-              <a:rPr lang="en-US" baseline="0" dirty="0" smtClean="0"/>
-              <a:t> happens during the lifetime of the program</a:t>
-            </a:r>
-          </a:p>
-          <a:p>
-            <a:pPr marL="171450" indent="-171450">
-              <a:buFont typeface="Arial" charset="0"/>
-              <a:buChar char="•"/>
-            </a:pPr>
-            <a:endParaRPr lang="en-US" baseline="0" dirty="0" smtClean="0"/>
-          </a:p>
-          <a:p>
-            <a:pPr marL="171450" indent="-171450">
-              <a:buFont typeface="Arial" charset="0"/>
-              <a:buChar char="•"/>
-            </a:pPr>
-            <a:r>
-              <a:rPr lang="en-US" baseline="0" dirty="0" smtClean="0"/>
-              <a:t>An item contains a link to another item of the same type</a:t>
-            </a:r>
-          </a:p>
-          <a:p>
-            <a:pPr marL="628650" lvl="1" indent="-171450">
-              <a:buFont typeface="Arial" charset="0"/>
-              <a:buChar char="•"/>
-            </a:pPr>
-            <a:r>
-              <a:rPr lang="en-US" baseline="0" dirty="0" smtClean="0"/>
-              <a:t>Strings, characters, numbers, items can be sorted, unsorted, duplicate or unique</a:t>
-            </a:r>
-          </a:p>
-          <a:p>
-            <a:pPr marL="171450" indent="-171450">
-              <a:buFont typeface="Arial" charset="0"/>
-              <a:buChar char="•"/>
-            </a:pPr>
-            <a:endParaRPr lang="en-US" baseline="0" dirty="0" smtClean="0"/>
-          </a:p>
-          <a:p>
-            <a:pPr marL="171450" indent="-171450">
-              <a:buFont typeface="Arial" charset="0"/>
-              <a:buChar char="•"/>
-            </a:pPr>
-            <a:r>
-              <a:rPr lang="en-US" baseline="0" dirty="0" smtClean="0"/>
-              <a:t>You can build a chain of items</a:t>
-            </a:r>
-          </a:p>
-          <a:p>
-            <a:pPr marL="171450" indent="-171450">
-              <a:buFont typeface="Arial" charset="0"/>
-              <a:buChar char="•"/>
-            </a:pPr>
-            <a:endParaRPr lang="en-US" baseline="0" dirty="0" smtClean="0"/>
-          </a:p>
-          <a:p>
-            <a:pPr marL="171450" indent="-171450">
-              <a:buFont typeface="Arial" charset="0"/>
-              <a:buChar char="•"/>
-            </a:pPr>
-            <a:r>
-              <a:rPr lang="en-US" baseline="0" dirty="0" smtClean="0"/>
-              <a:t>All data operations (add, delete, search, etc.) are possible on linked lists</a:t>
-            </a:r>
             <a:endParaRPr lang="en-US" dirty="0" smtClean="0"/>
           </a:p>
         </p:txBody>
@@ -3221,7 +2744,6 @@
               <a:rPr lang="en-US" baseline="0" dirty="0" smtClean="0"/>
               <a:t>We will need a linked list class for Pellets – we need a head and tail</a:t>
             </a:r>
-            <a:endParaRPr lang="en-US" baseline="0" dirty="0" smtClean="0"/>
           </a:p>
         </p:txBody>
       </p:sp>
@@ -3576,54 +3098,6 @@
           <a:bodyPr/>
           <a:lstStyle/>
           <a:p>
-            <a:pPr marL="171450" indent="-171450">
-              <a:buFont typeface="Arial" charset="0"/>
-              <a:buChar char="•"/>
-            </a:pPr>
-            <a:r>
-              <a:rPr lang="en-US" dirty="0" smtClean="0"/>
-              <a:t>To operate</a:t>
-            </a:r>
-            <a:r>
-              <a:rPr lang="en-US" baseline="0" dirty="0" smtClean="0"/>
-              <a:t> on lined lists, we need to know where their first and last nodes are. Thus, maintain special pointers to the head and tail</a:t>
-            </a:r>
-          </a:p>
-          <a:p>
-            <a:pPr marL="171450" indent="-171450">
-              <a:buFont typeface="Arial" charset="0"/>
-              <a:buChar char="•"/>
-            </a:pPr>
-            <a:endParaRPr lang="en-US" baseline="0" dirty="0" smtClean="0"/>
-          </a:p>
-          <a:p>
-            <a:pPr marL="171450" indent="-171450">
-              <a:buFont typeface="Arial" charset="0"/>
-              <a:buChar char="•"/>
-            </a:pPr>
-            <a:r>
-              <a:rPr lang="en-US" baseline="0" dirty="0" smtClean="0"/>
-              <a:t>In fact, as we shall see, the only thing a lined list needs to store is its head and tail pointers. It doesn’t store the nodes at all</a:t>
-            </a:r>
-          </a:p>
-          <a:p>
-            <a:pPr marL="171450" indent="-171450">
-              <a:buFont typeface="Arial" charset="0"/>
-              <a:buChar char="•"/>
-            </a:pPr>
-            <a:endParaRPr lang="en-US" baseline="0" dirty="0" smtClean="0"/>
-          </a:p>
-          <a:p>
-            <a:pPr marL="171450" indent="-171450">
-              <a:buFont typeface="Arial" charset="0"/>
-              <a:buChar char="•"/>
-            </a:pPr>
-            <a:r>
-              <a:rPr lang="en-US" baseline="0" dirty="0" smtClean="0"/>
-              <a:t>Given the head and tail, and on the assumption that all the nodes in the list are correctly hooked together, the list can be traversed, giving access to all the nodes, without explicitly store their locations</a:t>
-            </a:r>
-          </a:p>
-          <a:p>
             <a:pPr marL="0" indent="0">
               <a:buFont typeface="Arial" charset="0"/>
               <a:buNone/>
@@ -3712,88 +3186,6 @@
           <a:bodyPr/>
           <a:lstStyle/>
           <a:p>
-            <a:pPr marL="171450" indent="-171450">
-              <a:buFont typeface="Arial" charset="0"/>
-              <a:buChar char="•"/>
-            </a:pPr>
-            <a:r>
-              <a:rPr lang="en-US" dirty="0" smtClean="0"/>
-              <a:t>Any class can be</a:t>
-            </a:r>
-            <a:r>
-              <a:rPr lang="en-US" baseline="0" dirty="0" smtClean="0"/>
-              <a:t> a linked list node</a:t>
-            </a:r>
-          </a:p>
-          <a:p>
-            <a:pPr marL="171450" indent="-171450">
-              <a:buFont typeface="Arial" charset="0"/>
-              <a:buChar char="•"/>
-            </a:pPr>
-            <a:endParaRPr lang="en-US" baseline="0" dirty="0" smtClean="0"/>
-          </a:p>
-          <a:p>
-            <a:pPr marL="171450" indent="-171450">
-              <a:buFont typeface="Arial" charset="0"/>
-              <a:buChar char="•"/>
-            </a:pPr>
-            <a:r>
-              <a:rPr lang="en-US" baseline="0" dirty="0" smtClean="0"/>
-              <a:t>Nodes are simple objects</a:t>
-            </a:r>
-          </a:p>
-          <a:p>
-            <a:pPr marL="171450" indent="-171450">
-              <a:buFont typeface="Arial" charset="0"/>
-              <a:buChar char="•"/>
-            </a:pPr>
-            <a:endParaRPr lang="en-US" baseline="0" dirty="0" smtClean="0"/>
-          </a:p>
-          <a:p>
-            <a:pPr marL="171450" indent="-171450">
-              <a:buFont typeface="Arial" charset="0"/>
-              <a:buChar char="•"/>
-            </a:pPr>
-            <a:r>
-              <a:rPr lang="en-US" baseline="0" dirty="0" smtClean="0"/>
-              <a:t>Here is their generic structure…</a:t>
-            </a:r>
-          </a:p>
-          <a:p>
-            <a:pPr marL="171450" indent="-171450">
-              <a:buFont typeface="Arial" charset="0"/>
-              <a:buChar char="•"/>
-            </a:pPr>
-            <a:endParaRPr lang="en-US" baseline="0" dirty="0" smtClean="0"/>
-          </a:p>
-          <a:p>
-            <a:pPr marL="171450" indent="-171450">
-              <a:buFont typeface="Arial" charset="0"/>
-              <a:buChar char="•"/>
-            </a:pPr>
-            <a:r>
-              <a:rPr lang="en-US" baseline="0" dirty="0" smtClean="0"/>
-              <a:t>Note the Next pointer is a pointer to another item of the same type – the next node in the linked list</a:t>
-            </a:r>
-          </a:p>
-          <a:p>
-            <a:pPr marL="171450" indent="-171450">
-              <a:buFont typeface="Arial" charset="0"/>
-              <a:buChar char="•"/>
-            </a:pPr>
-            <a:endParaRPr lang="en-US" baseline="0" dirty="0" smtClean="0"/>
-          </a:p>
-          <a:p>
-            <a:pPr marL="171450" indent="-171450">
-              <a:buFont typeface="Arial" charset="0"/>
-              <a:buChar char="•"/>
-            </a:pPr>
-            <a:r>
-              <a:rPr lang="en-US" baseline="0" dirty="0" smtClean="0"/>
-              <a:t>Note that Next is capitalized for a reason</a:t>
-            </a:r>
-          </a:p>
-          <a:p>
             <a:pPr marL="0" indent="0">
               <a:buFont typeface="Arial" charset="0"/>
               <a:buNone/>
@@ -3886,48 +3278,6 @@
               <a:buFont typeface="Arial" charset="0"/>
               <a:buChar char="•"/>
             </a:pPr>
-            <a:r>
-              <a:rPr lang="en-US" dirty="0" smtClean="0"/>
-              <a:t>The linked</a:t>
-            </a:r>
-            <a:r>
-              <a:rPr lang="en-US" baseline="0" dirty="0" smtClean="0"/>
-              <a:t> list object doesn’t own any nodes directly</a:t>
-            </a:r>
-          </a:p>
-          <a:p>
-            <a:pPr marL="171450" indent="-171450">
-              <a:buFont typeface="Arial" charset="0"/>
-              <a:buChar char="•"/>
-            </a:pPr>
-            <a:endParaRPr lang="en-US" baseline="0" dirty="0" smtClean="0"/>
-          </a:p>
-          <a:p>
-            <a:pPr marL="171450" indent="-171450">
-              <a:buFont typeface="Arial" charset="0"/>
-              <a:buChar char="•"/>
-            </a:pPr>
-            <a:r>
-              <a:rPr lang="en-US" baseline="0" dirty="0" smtClean="0"/>
-              <a:t>It just keeps track of the head and tail nodes</a:t>
-            </a:r>
-          </a:p>
-          <a:p>
-            <a:pPr marL="171450" indent="-171450">
-              <a:buFont typeface="Arial" charset="0"/>
-              <a:buChar char="•"/>
-            </a:pPr>
-            <a:endParaRPr lang="en-US" baseline="0" dirty="0" smtClean="0"/>
-          </a:p>
-          <a:p>
-            <a:pPr marL="171450" indent="-171450">
-              <a:buFont typeface="Arial" charset="0"/>
-              <a:buChar char="•"/>
-            </a:pPr>
-            <a:r>
-              <a:rPr lang="en-US" baseline="0" dirty="0" smtClean="0"/>
-              <a:t>This is all it needs to insert, delete, traverse – i.e. perform all required list operations</a:t>
-            </a:r>
             <a:endParaRPr lang="en-US" dirty="0" smtClean="0"/>
           </a:p>
         </p:txBody>
@@ -4016,116 +3366,6 @@
               <a:buFont typeface="Arial" charset="0"/>
               <a:buChar char="•"/>
             </a:pPr>
-            <a:r>
-              <a:rPr lang="en-US" dirty="0" smtClean="0"/>
-              <a:t>Lists are</a:t>
-            </a:r>
-            <a:r>
-              <a:rPr lang="en-US" baseline="0" dirty="0" smtClean="0"/>
-              <a:t> empty when they start</a:t>
-            </a:r>
-          </a:p>
-          <a:p>
-            <a:pPr marL="171450" indent="-171450">
-              <a:buFont typeface="Arial" charset="0"/>
-              <a:buChar char="•"/>
-            </a:pPr>
-            <a:endParaRPr lang="en-US" baseline="0" dirty="0" smtClean="0"/>
-          </a:p>
-          <a:p>
-            <a:pPr marL="171450" indent="-171450">
-              <a:buFont typeface="Arial" charset="0"/>
-              <a:buChar char="•"/>
-            </a:pPr>
-            <a:r>
-              <a:rPr lang="en-US" baseline="0" dirty="0" smtClean="0"/>
-              <a:t>Be careful not to let pointers contain garbage – by garbage I mean memory addresses</a:t>
-            </a:r>
-          </a:p>
-          <a:p>
-            <a:pPr marL="171450" indent="-171450">
-              <a:buFont typeface="Arial" charset="0"/>
-              <a:buChar char="•"/>
-            </a:pPr>
-            <a:endParaRPr lang="en-US" baseline="0" dirty="0" smtClean="0"/>
-          </a:p>
-          <a:p>
-            <a:pPr marL="171450" indent="-171450">
-              <a:buFont typeface="Arial" charset="0"/>
-              <a:buChar char="•"/>
-            </a:pPr>
-            <a:r>
-              <a:rPr lang="en-US" baseline="0" dirty="0" smtClean="0"/>
-              <a:t>Always set “empty” pointers to the null value for the language and environment you are working in</a:t>
-            </a:r>
-          </a:p>
-          <a:p>
-            <a:pPr marL="171450" indent="-171450">
-              <a:buFont typeface="Arial" charset="0"/>
-              <a:buChar char="•"/>
-            </a:pPr>
-            <a:endParaRPr lang="en-US" baseline="0" dirty="0" smtClean="0"/>
-          </a:p>
-          <a:p>
-            <a:pPr marL="171450" indent="-171450">
-              <a:buFont typeface="Arial" charset="0"/>
-              <a:buChar char="•"/>
-            </a:pPr>
-            <a:r>
-              <a:rPr lang="en-US" baseline="0" dirty="0" smtClean="0"/>
-              <a:t>Note that way you express null is different language to language. In C#, it is null, but in Visual C++, it is nullptr</a:t>
-            </a:r>
-          </a:p>
-          <a:p>
-            <a:pPr marL="171450" indent="-171450">
-              <a:buFont typeface="Arial" charset="0"/>
-              <a:buChar char="•"/>
-            </a:pPr>
-            <a:endParaRPr lang="en-US" baseline="0" dirty="0" smtClean="0"/>
-          </a:p>
-          <a:p>
-            <a:pPr marL="171450" indent="-171450">
-              <a:buFont typeface="Arial" charset="0"/>
-              <a:buChar char="•"/>
-            </a:pPr>
-            <a:r>
-              <a:rPr lang="en-US" baseline="0" dirty="0" smtClean="0"/>
-              <a:t>You are going to be able to tell when linked lists are empty</a:t>
-            </a:r>
-          </a:p>
-          <a:p>
-            <a:pPr marL="171450" indent="-171450">
-              <a:buFont typeface="Arial" charset="0"/>
-              <a:buChar char="•"/>
-            </a:pPr>
-            <a:endParaRPr lang="en-US" baseline="0" dirty="0" smtClean="0"/>
-          </a:p>
-          <a:p>
-            <a:pPr marL="171450" indent="-171450">
-              <a:buFont typeface="Arial" charset="0"/>
-              <a:buChar char="•"/>
-            </a:pPr>
-            <a:r>
-              <a:rPr lang="en-US" baseline="0" dirty="0" smtClean="0"/>
-              <a:t>You have gotten to the end of the linked list by looking for these null pointers</a:t>
-            </a:r>
-          </a:p>
-          <a:p>
-            <a:pPr marL="171450" indent="-171450">
-              <a:buFont typeface="Arial" charset="0"/>
-              <a:buChar char="•"/>
-            </a:pPr>
-            <a:endParaRPr lang="en-US" baseline="0" dirty="0" smtClean="0"/>
-          </a:p>
-          <a:p>
-            <a:pPr marL="171450" indent="-171450">
-              <a:buFont typeface="Arial" charset="0"/>
-              <a:buChar char="•"/>
-            </a:pPr>
-            <a:r>
-              <a:rPr lang="en-US" baseline="0" dirty="0" smtClean="0"/>
-              <a:t>If you don’t initalise correctly to nullptr, the standard algorithm for linked list operations will not work</a:t>
-            </a:r>
             <a:endParaRPr lang="en-US" dirty="0" smtClean="0"/>
           </a:p>
         </p:txBody>
@@ -4214,14 +3454,6 @@
               <a:buFont typeface="Arial" charset="0"/>
               <a:buChar char="•"/>
             </a:pPr>
-            <a:r>
-              <a:rPr lang="en-US" dirty="0" smtClean="0"/>
-              <a:t>Pseudocode</a:t>
-            </a:r>
-            <a:r>
-              <a:rPr lang="en-US" baseline="0" dirty="0" smtClean="0"/>
-              <a:t> for counting the number of items in a linked list</a:t>
-            </a:r>
             <a:endParaRPr lang="en-US" dirty="0" smtClean="0"/>
           </a:p>
         </p:txBody>
@@ -4310,77 +3542,7 @@
               <a:buFont typeface="Arial" charset="0"/>
               <a:buChar char="•"/>
             </a:pPr>
-            <a:r>
-              <a:rPr lang="en-US" dirty="0" smtClean="0"/>
-              <a:t>Actual code – so use this in your practical today</a:t>
-            </a:r>
-          </a:p>
-          <a:p>
-            <a:pPr marL="171450" indent="-171450">
-              <a:buFont typeface="Arial" charset="0"/>
-              <a:buChar char="•"/>
-            </a:pPr>
             <a:endParaRPr lang="en-US" dirty="0" smtClean="0"/>
-          </a:p>
-          <a:p>
-            <a:pPr marL="171450" indent="-171450">
-              <a:buFont typeface="Arial" charset="0"/>
-              <a:buChar char="•"/>
-            </a:pPr>
-            <a:r>
-              <a:rPr lang="en-US" dirty="0" smtClean="0"/>
-              <a:t>Note how critical it</a:t>
-            </a:r>
-            <a:r>
-              <a:rPr lang="en-US" baseline="0" dirty="0" smtClean="0"/>
-              <a:t> is that Next always be initalised to </a:t>
-            </a:r>
-            <a:r>
-              <a:rPr lang="en-US" baseline="0" dirty="0" err="1" smtClean="0"/>
-              <a:t>nullptr</a:t>
-            </a:r>
-            <a:r>
-              <a:rPr lang="en-US" baseline="0" dirty="0" smtClean="0"/>
-              <a:t> in the constructor</a:t>
-            </a:r>
-          </a:p>
-          <a:p>
-            <a:pPr marL="171450" indent="-171450">
-              <a:buFont typeface="Arial" charset="0"/>
-              <a:buChar char="•"/>
-            </a:pPr>
-            <a:endParaRPr lang="en-US" baseline="0" dirty="0" smtClean="0"/>
-          </a:p>
-          <a:p>
-            <a:pPr marL="171450" indent="-171450">
-              <a:buFont typeface="Arial" charset="0"/>
-              <a:buChar char="•"/>
-            </a:pPr>
-            <a:r>
-              <a:rPr lang="en-US" baseline="0" dirty="0" smtClean="0"/>
-              <a:t>If you don’t do this, the while is infinite or until in breaks the computer</a:t>
-            </a:r>
-          </a:p>
-          <a:p>
-            <a:pPr marL="171450" indent="-171450">
-              <a:buFont typeface="Arial" charset="0"/>
-              <a:buChar char="•"/>
-            </a:pPr>
-            <a:endParaRPr lang="en-US" dirty="0" smtClean="0"/>
-          </a:p>
-          <a:p>
-            <a:pPr marL="171450" indent="-171450">
-              <a:buFont typeface="Arial" charset="0"/>
-              <a:buChar char="•"/>
-            </a:pPr>
-            <a:r>
-              <a:rPr lang="en-US" dirty="0" smtClean="0"/>
-              <a:t>What </a:t>
-            </a:r>
-            <a:r>
-              <a:rPr lang="en-US" dirty="0" smtClean="0"/>
-              <a:t>type is it returning?</a:t>
-            </a:r>
           </a:p>
         </p:txBody>
       </p:sp>
@@ -4601,7 +3763,7 @@
           <a:p>
             <a:fld id="{F8166F1F-CE9B-4651-A6AA-CD717754106B}" type="datetimeFigureOut">
               <a:rPr lang="en-US" smtClean="0"/>
-              <a:t>8/6/2019</a:t>
+              <a:t>8/7/19</a:t>
             </a:fld>
             <a:endParaRPr lang="en-US"/>
           </a:p>
@@ -4766,7 +3928,7 @@
           <a:p>
             <a:fld id="{A76116CE-C4A3-4A05-B2D7-7C2E9A889C0F}" type="datetimeFigureOut">
               <a:rPr lang="en-US" smtClean="0"/>
-              <a:t>8/6/2019</a:t>
+              <a:t>8/7/19</a:t>
             </a:fld>
             <a:endParaRPr lang="en-US"/>
           </a:p>
@@ -4941,7 +4103,7 @@
           <a:p>
             <a:fld id="{A76116CE-C4A3-4A05-B2D7-7C2E9A889C0F}" type="datetimeFigureOut">
               <a:rPr lang="en-US" smtClean="0"/>
-              <a:t>8/6/2019</a:t>
+              <a:t>8/7/19</a:t>
             </a:fld>
             <a:endParaRPr lang="en-US"/>
           </a:p>
@@ -5108,7 +4270,7 @@
           <a:p>
             <a:fld id="{A76116CE-C4A3-4A05-B2D7-7C2E9A889C0F}" type="datetimeFigureOut">
               <a:rPr lang="en-US" smtClean="0"/>
-              <a:t>8/6/2019</a:t>
+              <a:t>8/7/19</a:t>
             </a:fld>
             <a:endParaRPr lang="en-US"/>
           </a:p>
@@ -5349,7 +4511,7 @@
           <a:p>
             <a:fld id="{A76116CE-C4A3-4A05-B2D7-7C2E9A889C0F}" type="datetimeFigureOut">
               <a:rPr lang="en-US" smtClean="0"/>
-              <a:t>8/6/2019</a:t>
+              <a:t>8/7/19</a:t>
             </a:fld>
             <a:endParaRPr lang="en-US"/>
           </a:p>
@@ -5632,7 +4794,7 @@
           <a:p>
             <a:fld id="{A76116CE-C4A3-4A05-B2D7-7C2E9A889C0F}" type="datetimeFigureOut">
               <a:rPr lang="en-US" smtClean="0"/>
-              <a:t>8/6/2019</a:t>
+              <a:t>8/7/19</a:t>
             </a:fld>
             <a:endParaRPr lang="en-US"/>
           </a:p>
@@ -6049,7 +5211,7 @@
           <a:p>
             <a:fld id="{A76116CE-C4A3-4A05-B2D7-7C2E9A889C0F}" type="datetimeFigureOut">
               <a:rPr lang="en-US" smtClean="0"/>
-              <a:t>8/6/2019</a:t>
+              <a:t>8/7/19</a:t>
             </a:fld>
             <a:endParaRPr lang="en-US"/>
           </a:p>
@@ -6162,7 +5324,7 @@
           <a:p>
             <a:fld id="{A76116CE-C4A3-4A05-B2D7-7C2E9A889C0F}" type="datetimeFigureOut">
               <a:rPr lang="en-US" smtClean="0"/>
-              <a:t>8/6/2019</a:t>
+              <a:t>8/7/19</a:t>
             </a:fld>
             <a:endParaRPr lang="en-US"/>
           </a:p>
@@ -6252,7 +5414,7 @@
           <a:p>
             <a:fld id="{A76116CE-C4A3-4A05-B2D7-7C2E9A889C0F}" type="datetimeFigureOut">
               <a:rPr lang="en-US" smtClean="0"/>
-              <a:t>8/6/2019</a:t>
+              <a:t>8/7/19</a:t>
             </a:fld>
             <a:endParaRPr lang="en-US"/>
           </a:p>
@@ -6524,7 +5686,7 @@
           <a:p>
             <a:fld id="{A76116CE-C4A3-4A05-B2D7-7C2E9A889C0F}" type="datetimeFigureOut">
               <a:rPr lang="en-US" smtClean="0"/>
-              <a:t>8/6/2019</a:t>
+              <a:t>8/7/19</a:t>
             </a:fld>
             <a:endParaRPr lang="en-US"/>
           </a:p>
@@ -6772,7 +5934,7 @@
           <a:p>
             <a:fld id="{A76116CE-C4A3-4A05-B2D7-7C2E9A889C0F}" type="datetimeFigureOut">
               <a:rPr lang="en-US" smtClean="0"/>
-              <a:t>8/6/2019</a:t>
+              <a:t>8/7/19</a:t>
             </a:fld>
             <a:endParaRPr lang="en-US"/>
           </a:p>
@@ -6980,7 +6142,7 @@
           <a:p>
             <a:fld id="{F8166F1F-CE9B-4651-A6AA-CD717754106B}" type="datetimeFigureOut">
               <a:rPr lang="en-US" smtClean="0"/>
-              <a:t>8/6/2019</a:t>
+              <a:t>8/7/19</a:t>
             </a:fld>
             <a:endParaRPr lang="en-US"/>
           </a:p>
@@ -12049,13 +11211,8 @@
             </a:pPr>
             <a:r>
               <a:rPr lang="en-US" sz="2500" dirty="0" smtClean="0"/>
-              <a:t>Deleting </a:t>
-            </a:r>
-            <a:r>
-              <a:rPr lang="en-US" sz="2500" dirty="0" smtClean="0"/>
-              <a:t>monster3</a:t>
-            </a:r>
-            <a:endParaRPr lang="en-US" sz="2500" dirty="0" smtClean="0"/>
+              <a:t>Deleting monster3</a:t>
+            </a:r>
           </a:p>
         </p:txBody>
       </p:sp>
@@ -12865,13 +12022,8 @@
             </a:pPr>
             <a:r>
               <a:rPr lang="en-US" sz="2500" dirty="0" smtClean="0"/>
-              <a:t>Deleting </a:t>
-            </a:r>
-            <a:r>
-              <a:rPr lang="en-US" sz="2500" dirty="0" smtClean="0"/>
-              <a:t>monster3</a:t>
-            </a:r>
-            <a:endParaRPr lang="en-US" sz="2500" dirty="0" smtClean="0"/>
+              <a:t>Deleting monster3</a:t>
+            </a:r>
           </a:p>
         </p:txBody>
       </p:sp>

</xml_diff>